<commit_message>
update to hw and slides
</commit_message>
<xml_diff>
--- a/source/lessons/lsn13/Lsn13.pptx
+++ b/source/lessons/lsn13/Lsn13.pptx
@@ -1388,7 +1388,7 @@
           <a:p>
             <a:fld id="{834513E8-165F-4932-9E2D-FD497CB9A4FD}" type="datetimeFigureOut">
               <a:rPr lang="en-US" smtClean="0"/>
-              <a:t>7/16/2018</a:t>
+              <a:t>7/23/2018</a:t>
             </a:fld>
             <a:endParaRPr lang="en-US"/>
           </a:p>
@@ -1483,7 +1483,7 @@
           <a:p>
             <a:fld id="{834513E8-165F-4932-9E2D-FD497CB9A4FD}" type="datetimeFigureOut">
               <a:rPr lang="en-US" smtClean="0"/>
-              <a:t>7/16/2018</a:t>
+              <a:t>7/23/2018</a:t>
             </a:fld>
             <a:endParaRPr lang="en-US"/>
           </a:p>
@@ -1760,7 +1760,7 @@
           <a:p>
             <a:fld id="{834513E8-165F-4932-9E2D-FD497CB9A4FD}" type="datetimeFigureOut">
               <a:rPr lang="en-US" smtClean="0"/>
-              <a:t>7/16/2018</a:t>
+              <a:t>7/23/2018</a:t>
             </a:fld>
             <a:endParaRPr lang="en-US"/>
           </a:p>
@@ -2013,7 +2013,7 @@
           <a:p>
             <a:fld id="{834513E8-165F-4932-9E2D-FD497CB9A4FD}" type="datetimeFigureOut">
               <a:rPr lang="en-US" smtClean="0"/>
-              <a:t>7/16/2018</a:t>
+              <a:t>7/23/2018</a:t>
             </a:fld>
             <a:endParaRPr lang="en-US"/>
           </a:p>
@@ -2183,7 +2183,7 @@
           <a:p>
             <a:fld id="{834513E8-165F-4932-9E2D-FD497CB9A4FD}" type="datetimeFigureOut">
               <a:rPr lang="en-US" smtClean="0"/>
-              <a:t>7/16/2018</a:t>
+              <a:t>7/23/2018</a:t>
             </a:fld>
             <a:endParaRPr lang="en-US"/>
           </a:p>
@@ -2363,7 +2363,7 @@
           <a:p>
             <a:fld id="{834513E8-165F-4932-9E2D-FD497CB9A4FD}" type="datetimeFigureOut">
               <a:rPr lang="en-US" smtClean="0"/>
-              <a:t>7/16/2018</a:t>
+              <a:t>7/23/2018</a:t>
             </a:fld>
             <a:endParaRPr lang="en-US"/>
           </a:p>
@@ -3183,7 +3183,7 @@
           <a:p>
             <a:fld id="{834513E8-165F-4932-9E2D-FD497CB9A4FD}" type="datetimeFigureOut">
               <a:rPr lang="en-US" smtClean="0"/>
-              <a:t>7/16/2018</a:t>
+              <a:t>7/23/2018</a:t>
             </a:fld>
             <a:endParaRPr lang="en-US"/>
           </a:p>
@@ -3353,7 +3353,7 @@
           <a:p>
             <a:fld id="{834513E8-165F-4932-9E2D-FD497CB9A4FD}" type="datetimeFigureOut">
               <a:rPr lang="en-US" smtClean="0"/>
-              <a:t>7/16/2018</a:t>
+              <a:t>7/23/2018</a:t>
             </a:fld>
             <a:endParaRPr lang="en-US"/>
           </a:p>
@@ -3599,7 +3599,7 @@
           <a:p>
             <a:fld id="{834513E8-165F-4932-9E2D-FD497CB9A4FD}" type="datetimeFigureOut">
               <a:rPr lang="en-US" smtClean="0"/>
-              <a:t>7/16/2018</a:t>
+              <a:t>7/23/2018</a:t>
             </a:fld>
             <a:endParaRPr lang="en-US"/>
           </a:p>
@@ -3831,7 +3831,7 @@
           <a:p>
             <a:fld id="{834513E8-165F-4932-9E2D-FD497CB9A4FD}" type="datetimeFigureOut">
               <a:rPr lang="en-US" smtClean="0"/>
-              <a:t>7/16/2018</a:t>
+              <a:t>7/23/2018</a:t>
             </a:fld>
             <a:endParaRPr lang="en-US"/>
           </a:p>
@@ -4198,7 +4198,7 @@
           <a:p>
             <a:fld id="{834513E8-165F-4932-9E2D-FD497CB9A4FD}" type="datetimeFigureOut">
               <a:rPr lang="en-US" smtClean="0"/>
-              <a:t>7/16/2018</a:t>
+              <a:t>7/23/2018</a:t>
             </a:fld>
             <a:endParaRPr lang="en-US"/>
           </a:p>
@@ -6015,7 +6015,7 @@
           <a:p>
             <a:fld id="{834513E8-165F-4932-9E2D-FD497CB9A4FD}" type="datetimeFigureOut">
               <a:rPr lang="en-US" smtClean="0"/>
-              <a:t>7/16/2018</a:t>
+              <a:t>7/23/2018</a:t>
             </a:fld>
             <a:endParaRPr lang="en-US"/>
           </a:p>
@@ -7564,6 +7564,84 @@
           </a:p>
         </p:txBody>
       </p:sp>
+      <p:sp>
+        <p:nvSpPr>
+          <p:cNvPr id="4" name="Right Arrow 3"/>
+          <p:cNvSpPr/>
+          <p:nvPr/>
+        </p:nvSpPr>
+        <p:spPr bwMode="auto">
+          <a:xfrm>
+            <a:off x="386255" y="4335517"/>
+            <a:ext cx="2538248" cy="748862"/>
+          </a:xfrm>
+          <a:prstGeom prst="rightArrow">
+            <a:avLst/>
+          </a:prstGeom>
+          <a:solidFill>
+            <a:srgbClr val="0C2D83"/>
+          </a:solidFill>
+          <a:ln w="12700" cap="flat" cmpd="sng" algn="ctr">
+            <a:solidFill>
+              <a:schemeClr val="tx1"/>
+            </a:solidFill>
+            <a:prstDash val="solid"/>
+            <a:round/>
+            <a:headEnd type="none" w="med" len="med"/>
+            <a:tailEnd type="none" w="med" len="med"/>
+          </a:ln>
+          <a:effectLst/>
+        </p:spPr>
+        <p:txBody>
+          <a:bodyPr vert="horz" wrap="square" lIns="91440" tIns="45720" rIns="91440" bIns="45720" numCol="1" rtlCol="0" anchor="t" anchorCtr="0" compatLnSpc="1">
+            <a:prstTxWarp prst="textNoShape">
+              <a:avLst/>
+            </a:prstTxWarp>
+          </a:bodyPr>
+          <a:lstStyle/>
+          <a:p>
+            <a:pPr marL="0" marR="0" indent="0" algn="ctr" defTabSz="914400" rtl="0" eaLnBrk="0" fontAlgn="base" latinLnBrk="0" hangingPunct="0">
+              <a:lnSpc>
+                <a:spcPct val="100000"/>
+              </a:lnSpc>
+              <a:spcBef>
+                <a:spcPct val="0"/>
+              </a:spcBef>
+              <a:spcAft>
+                <a:spcPct val="0"/>
+              </a:spcAft>
+              <a:buClrTx/>
+              <a:buSzTx/>
+              <a:buFontTx/>
+              <a:buNone/>
+              <a:tabLst/>
+            </a:pPr>
+            <a:r>
+              <a:rPr kumimoji="0" lang="en-US" sz="1600" b="0" i="0" u="none" strike="noStrike" cap="none" normalizeH="0" baseline="0" dirty="0" smtClean="0">
+                <a:ln>
+                  <a:noFill/>
+                </a:ln>
+                <a:solidFill>
+                  <a:schemeClr val="bg1"/>
+                </a:solidFill>
+                <a:effectLst/>
+                <a:latin typeface="Arial" charset="0"/>
+              </a:rPr>
+              <a:t>Invalid Logic Levels</a:t>
+            </a:r>
+            <a:endParaRPr kumimoji="0" lang="en-US" sz="1600" b="0" i="0" u="none" strike="noStrike" cap="none" normalizeH="0" baseline="0" dirty="0" smtClean="0">
+              <a:ln>
+                <a:noFill/>
+              </a:ln>
+              <a:solidFill>
+                <a:schemeClr val="bg1"/>
+              </a:solidFill>
+              <a:effectLst/>
+              <a:latin typeface="Arial" charset="0"/>
+            </a:endParaRPr>
+          </a:p>
+        </p:txBody>
+      </p:sp>
     </p:spTree>
     <p:extLst>
       <p:ext uri="{BB962C8B-B14F-4D97-AF65-F5344CB8AC3E}">
@@ -7905,17 +7983,7 @@
                 <a:latin typeface="Courier New" pitchFamily="49" charset="0"/>
                 <a:cs typeface="Courier New" pitchFamily="49" charset="0"/>
               </a:rPr>
-              <a:t>       ; </a:t>
-            </a:r>
-            <a:r>
-              <a:rPr lang="en-US" sz="1400" dirty="0" smtClean="0">
-                <a:solidFill>
-                  <a:srgbClr val="00B050"/>
-                </a:solidFill>
-                <a:latin typeface="Courier New" pitchFamily="49" charset="0"/>
-                <a:cs typeface="Courier New" pitchFamily="49" charset="0"/>
-              </a:rPr>
-              <a:t>what is on pin 3? Input or output?</a:t>
+              <a:t>       ; what is on pin 3? Input or output?</a:t>
             </a:r>
             <a:endParaRPr lang="en-US" sz="1400" dirty="0">
               <a:solidFill>
@@ -8059,17 +8127,7 @@
                 <a:latin typeface="Courier New" pitchFamily="49" charset="0"/>
                 <a:cs typeface="Courier New" pitchFamily="49" charset="0"/>
               </a:rPr>
-              <a:t>; </a:t>
-            </a:r>
-            <a:r>
-              <a:rPr lang="en-US" sz="1400" dirty="0" smtClean="0">
-                <a:solidFill>
-                  <a:srgbClr val="00B050"/>
-                </a:solidFill>
-                <a:latin typeface="Courier New" pitchFamily="49" charset="0"/>
-                <a:cs typeface="Courier New" pitchFamily="49" charset="0"/>
-              </a:rPr>
-              <a:t>pull-up or pull-down?</a:t>
+              <a:t>; pull-up or pull-down?</a:t>
             </a:r>
             <a:endParaRPr lang="en-US" sz="1400" dirty="0">
               <a:solidFill>
@@ -8592,16 +8650,6 @@
               </a:rPr>
               <a:t>Time permitting, let’s run this on your processor</a:t>
             </a:r>
-            <a:endParaRPr kumimoji="0" lang="en-US" sz="1600" b="0" i="0" u="none" strike="noStrike" cap="none" normalizeH="0" baseline="0" dirty="0" smtClean="0">
-              <a:ln>
-                <a:noFill/>
-              </a:ln>
-              <a:solidFill>
-                <a:schemeClr val="bg1"/>
-              </a:solidFill>
-              <a:effectLst/>
-              <a:latin typeface="Arial" charset="0"/>
-            </a:endParaRPr>
           </a:p>
         </p:txBody>
       </p:sp>
@@ -10481,11 +10529,7 @@
           <a:p>
             <a:r>
               <a:rPr lang="en-US" dirty="0" smtClean="0"/>
-              <a:t>In order to be useful, micro controllers need to be able to talk with sensors and other </a:t>
-            </a:r>
-            <a:r>
-              <a:rPr lang="en-US" dirty="0" smtClean="0"/>
-              <a:t>processors/hardware</a:t>
+              <a:t>In order to be useful, micro controllers need to be able to talk with sensors and other processors/hardware</a:t>
             </a:r>
             <a:endParaRPr lang="en-US" dirty="0"/>
           </a:p>

</xml_diff>

<commit_message>
lab 1 and lsn13 updates
</commit_message>
<xml_diff>
--- a/source/lessons/lsn13/Lsn13.pptx
+++ b/source/lessons/lsn13/Lsn13.pptx
@@ -26,8 +26,8 @@
     <p:sldId id="369" r:id="rId14"/>
     <p:sldId id="364" r:id="rId15"/>
     <p:sldId id="372" r:id="rId16"/>
-    <p:sldId id="363" r:id="rId17"/>
-    <p:sldId id="367" r:id="rId18"/>
+    <p:sldId id="367" r:id="rId17"/>
+    <p:sldId id="363" r:id="rId18"/>
     <p:sldId id="353" r:id="rId19"/>
     <p:sldId id="370" r:id="rId20"/>
   </p:sldIdLst>
@@ -1390,7 +1390,7 @@
           <a:p>
             <a:fld id="{834513E8-165F-4932-9E2D-FD497CB9A4FD}" type="datetimeFigureOut">
               <a:rPr lang="en-US" smtClean="0"/>
-              <a:t>8/30/2018</a:t>
+              <a:t>9/7/2018</a:t>
             </a:fld>
             <a:endParaRPr lang="en-US"/>
           </a:p>
@@ -1485,7 +1485,7 @@
           <a:p>
             <a:fld id="{834513E8-165F-4932-9E2D-FD497CB9A4FD}" type="datetimeFigureOut">
               <a:rPr lang="en-US" smtClean="0"/>
-              <a:t>8/30/2018</a:t>
+              <a:t>9/7/2018</a:t>
             </a:fld>
             <a:endParaRPr lang="en-US"/>
           </a:p>
@@ -1762,7 +1762,7 @@
           <a:p>
             <a:fld id="{834513E8-165F-4932-9E2D-FD497CB9A4FD}" type="datetimeFigureOut">
               <a:rPr lang="en-US" smtClean="0"/>
-              <a:t>8/30/2018</a:t>
+              <a:t>9/7/2018</a:t>
             </a:fld>
             <a:endParaRPr lang="en-US"/>
           </a:p>
@@ -2015,7 +2015,7 @@
           <a:p>
             <a:fld id="{834513E8-165F-4932-9E2D-FD497CB9A4FD}" type="datetimeFigureOut">
               <a:rPr lang="en-US" smtClean="0"/>
-              <a:t>8/30/2018</a:t>
+              <a:t>9/7/2018</a:t>
             </a:fld>
             <a:endParaRPr lang="en-US"/>
           </a:p>
@@ -2185,7 +2185,7 @@
           <a:p>
             <a:fld id="{834513E8-165F-4932-9E2D-FD497CB9A4FD}" type="datetimeFigureOut">
               <a:rPr lang="en-US" smtClean="0"/>
-              <a:t>8/30/2018</a:t>
+              <a:t>9/7/2018</a:t>
             </a:fld>
             <a:endParaRPr lang="en-US"/>
           </a:p>
@@ -2365,7 +2365,7 @@
           <a:p>
             <a:fld id="{834513E8-165F-4932-9E2D-FD497CB9A4FD}" type="datetimeFigureOut">
               <a:rPr lang="en-US" smtClean="0"/>
-              <a:t>8/30/2018</a:t>
+              <a:t>9/7/2018</a:t>
             </a:fld>
             <a:endParaRPr lang="en-US"/>
           </a:p>
@@ -3185,7 +3185,7 @@
           <a:p>
             <a:fld id="{834513E8-165F-4932-9E2D-FD497CB9A4FD}" type="datetimeFigureOut">
               <a:rPr lang="en-US" smtClean="0"/>
-              <a:t>8/30/2018</a:t>
+              <a:t>9/7/2018</a:t>
             </a:fld>
             <a:endParaRPr lang="en-US"/>
           </a:p>
@@ -3355,7 +3355,7 @@
           <a:p>
             <a:fld id="{834513E8-165F-4932-9E2D-FD497CB9A4FD}" type="datetimeFigureOut">
               <a:rPr lang="en-US" smtClean="0"/>
-              <a:t>8/30/2018</a:t>
+              <a:t>9/7/2018</a:t>
             </a:fld>
             <a:endParaRPr lang="en-US"/>
           </a:p>
@@ -3601,7 +3601,7 @@
           <a:p>
             <a:fld id="{834513E8-165F-4932-9E2D-FD497CB9A4FD}" type="datetimeFigureOut">
               <a:rPr lang="en-US" smtClean="0"/>
-              <a:t>8/30/2018</a:t>
+              <a:t>9/7/2018</a:t>
             </a:fld>
             <a:endParaRPr lang="en-US"/>
           </a:p>
@@ -3833,7 +3833,7 @@
           <a:p>
             <a:fld id="{834513E8-165F-4932-9E2D-FD497CB9A4FD}" type="datetimeFigureOut">
               <a:rPr lang="en-US" smtClean="0"/>
-              <a:t>8/30/2018</a:t>
+              <a:t>9/7/2018</a:t>
             </a:fld>
             <a:endParaRPr lang="en-US"/>
           </a:p>
@@ -4200,7 +4200,7 @@
           <a:p>
             <a:fld id="{834513E8-165F-4932-9E2D-FD497CB9A4FD}" type="datetimeFigureOut">
               <a:rPr lang="en-US" smtClean="0"/>
-              <a:t>8/30/2018</a:t>
+              <a:t>9/7/2018</a:t>
             </a:fld>
             <a:endParaRPr lang="en-US"/>
           </a:p>
@@ -6017,7 +6017,7 @@
           <a:p>
             <a:fld id="{834513E8-165F-4932-9E2D-FD497CB9A4FD}" type="datetimeFigureOut">
               <a:rPr lang="en-US" smtClean="0"/>
-              <a:t>8/30/2018</a:t>
+              <a:t>9/7/2018</a:t>
             </a:fld>
             <a:endParaRPr lang="en-US"/>
           </a:p>
@@ -8646,22 +8646,14 @@
             <a:pPr lvl="1"/>
             <a:r>
               <a:rPr lang="en-US" b="0" dirty="0" smtClean="0"/>
-              <a:t>Imagine </a:t>
-            </a:r>
+              <a:t>Imagine the input is tied to a pilot’s ejection seat</a:t>
+            </a:r>
+          </a:p>
+          <a:p>
+            <a:pPr lvl="1"/>
             <a:r>
               <a:rPr lang="en-US" b="0" dirty="0" smtClean="0"/>
-              <a:t>the input is tied to a pilot’s ejection seat</a:t>
-            </a:r>
-          </a:p>
-          <a:p>
-            <a:pPr lvl="1"/>
-            <a:r>
-              <a:rPr lang="en-US" b="0" dirty="0" smtClean="0"/>
-              <a:t>Imagine </a:t>
-            </a:r>
-            <a:r>
-              <a:rPr lang="en-US" b="0" dirty="0" smtClean="0"/>
-              <a:t>the </a:t>
+              <a:t>Imagine the </a:t>
             </a:r>
             <a:r>
               <a:rPr lang="en-US" b="0" dirty="0" err="1" smtClean="0"/>
@@ -8684,11 +8676,7 @@
             <a:pPr lvl="1"/>
             <a:r>
               <a:rPr lang="en-US" b="0" dirty="0" smtClean="0"/>
-              <a:t>Imagine </a:t>
-            </a:r>
-            <a:r>
-              <a:rPr lang="en-US" b="0" dirty="0" smtClean="0"/>
-              <a:t>another </a:t>
+              <a:t>Imagine another </a:t>
             </a:r>
             <a:r>
               <a:rPr lang="en-US" b="0" dirty="0" err="1" smtClean="0"/>
@@ -9164,1017 +9152,6 @@
           <a:p>
             <a:r>
               <a:rPr lang="en-US" b="1" dirty="0" smtClean="0"/>
-              <a:t>Example Program</a:t>
-            </a:r>
-            <a:endParaRPr lang="en-US" dirty="0"/>
-          </a:p>
-        </p:txBody>
-      </p:sp>
-      <p:sp>
-        <p:nvSpPr>
-          <p:cNvPr id="3" name="Content Placeholder 2"/>
-          <p:cNvSpPr>
-            <a:spLocks noGrp="1"/>
-          </p:cNvSpPr>
-          <p:nvPr>
-            <p:ph idx="1"/>
-          </p:nvPr>
-        </p:nvSpPr>
-        <p:spPr>
-          <a:xfrm>
-            <a:off x="369127" y="1543385"/>
-            <a:ext cx="8083562" cy="4384174"/>
-          </a:xfrm>
-        </p:spPr>
-        <p:txBody>
-          <a:bodyPr>
-            <a:normAutofit fontScale="92500" lnSpcReduction="10000"/>
-          </a:bodyPr>
-          <a:lstStyle/>
-          <a:p>
-            <a:pPr marL="0" indent="0">
-              <a:buNone/>
-            </a:pPr>
-            <a:endParaRPr lang="en-US" sz="1400" dirty="0" smtClean="0">
-              <a:solidFill>
-                <a:schemeClr val="accent2"/>
-              </a:solidFill>
-              <a:latin typeface="Courier New" pitchFamily="49" charset="0"/>
-              <a:cs typeface="Courier New" pitchFamily="49" charset="0"/>
-            </a:endParaRPr>
-          </a:p>
-          <a:p>
-            <a:pPr marL="0" indent="0">
-              <a:buNone/>
-            </a:pPr>
-            <a:endParaRPr lang="en-US" sz="1400" dirty="0">
-              <a:solidFill>
-                <a:schemeClr val="accent2"/>
-              </a:solidFill>
-              <a:latin typeface="Courier New" pitchFamily="49" charset="0"/>
-              <a:cs typeface="Courier New" pitchFamily="49" charset="0"/>
-            </a:endParaRPr>
-          </a:p>
-          <a:p>
-            <a:pPr marL="0" indent="0">
-              <a:buNone/>
-            </a:pPr>
-            <a:endParaRPr lang="en-US" sz="1400" dirty="0" smtClean="0">
-              <a:solidFill>
-                <a:schemeClr val="accent2"/>
-              </a:solidFill>
-              <a:latin typeface="Courier New" pitchFamily="49" charset="0"/>
-              <a:cs typeface="Courier New" pitchFamily="49" charset="0"/>
-            </a:endParaRPr>
-          </a:p>
-          <a:p>
-            <a:pPr marL="0" indent="0">
-              <a:buNone/>
-            </a:pPr>
-            <a:endParaRPr lang="en-US" sz="1400" dirty="0">
-              <a:solidFill>
-                <a:schemeClr val="accent2"/>
-              </a:solidFill>
-              <a:latin typeface="Courier New" pitchFamily="49" charset="0"/>
-              <a:cs typeface="Courier New" pitchFamily="49" charset="0"/>
-            </a:endParaRPr>
-          </a:p>
-          <a:p>
-            <a:pPr marL="0" indent="0">
-              <a:buNone/>
-            </a:pPr>
-            <a:endParaRPr lang="en-US" sz="1400" dirty="0" smtClean="0">
-              <a:solidFill>
-                <a:schemeClr val="accent2"/>
-              </a:solidFill>
-              <a:latin typeface="Courier New" pitchFamily="49" charset="0"/>
-              <a:cs typeface="Courier New" pitchFamily="49" charset="0"/>
-            </a:endParaRPr>
-          </a:p>
-          <a:p>
-            <a:pPr marL="0" indent="0">
-              <a:buNone/>
-            </a:pPr>
-            <a:endParaRPr lang="en-US" sz="1400" dirty="0">
-              <a:solidFill>
-                <a:schemeClr val="accent2"/>
-              </a:solidFill>
-              <a:latin typeface="Courier New" pitchFamily="49" charset="0"/>
-              <a:cs typeface="Courier New" pitchFamily="49" charset="0"/>
-            </a:endParaRPr>
-          </a:p>
-          <a:p>
-            <a:pPr marL="0" indent="0">
-              <a:buNone/>
-            </a:pPr>
-            <a:endParaRPr lang="en-US" sz="1400" dirty="0" smtClean="0">
-              <a:solidFill>
-                <a:schemeClr val="accent2"/>
-              </a:solidFill>
-              <a:latin typeface="Courier New" pitchFamily="49" charset="0"/>
-              <a:cs typeface="Courier New" pitchFamily="49" charset="0"/>
-            </a:endParaRPr>
-          </a:p>
-          <a:p>
-            <a:pPr marL="0" indent="0">
-              <a:buNone/>
-            </a:pPr>
-            <a:endParaRPr lang="en-US" sz="1400" dirty="0">
-              <a:solidFill>
-                <a:schemeClr val="accent2"/>
-              </a:solidFill>
-              <a:latin typeface="Courier New" pitchFamily="49" charset="0"/>
-              <a:cs typeface="Courier New" pitchFamily="49" charset="0"/>
-            </a:endParaRPr>
-          </a:p>
-          <a:p>
-            <a:pPr marL="0" indent="0">
-              <a:buNone/>
-            </a:pPr>
-            <a:r>
-              <a:rPr lang="en-US" sz="1400" dirty="0" smtClean="0">
-                <a:solidFill>
-                  <a:schemeClr val="accent2"/>
-                </a:solidFill>
-                <a:latin typeface="Courier New" pitchFamily="49" charset="0"/>
-                <a:cs typeface="Courier New" pitchFamily="49" charset="0"/>
-              </a:rPr>
-              <a:t>              </a:t>
-            </a:r>
-            <a:r>
-              <a:rPr lang="en-US" sz="1400" dirty="0" err="1" smtClean="0">
-                <a:solidFill>
-                  <a:schemeClr val="accent2"/>
-                </a:solidFill>
-                <a:latin typeface="Courier New" pitchFamily="49" charset="0"/>
-                <a:cs typeface="Courier New" pitchFamily="49" charset="0"/>
-              </a:rPr>
-              <a:t>bis.b</a:t>
-            </a:r>
-            <a:r>
-              <a:rPr lang="en-US" sz="1400" dirty="0" smtClean="0">
-                <a:solidFill>
-                  <a:schemeClr val="accent2"/>
-                </a:solidFill>
-                <a:latin typeface="Courier New" pitchFamily="49" charset="0"/>
-                <a:cs typeface="Courier New" pitchFamily="49" charset="0"/>
-              </a:rPr>
-              <a:t>  </a:t>
-            </a:r>
-            <a:r>
-              <a:rPr lang="en-US" sz="1400" dirty="0">
-                <a:solidFill>
-                  <a:schemeClr val="accent2"/>
-                </a:solidFill>
-                <a:latin typeface="Courier New" pitchFamily="49" charset="0"/>
-                <a:cs typeface="Courier New" pitchFamily="49" charset="0"/>
-              </a:rPr>
-              <a:t>#BIT0|BIT6, &amp;</a:t>
-            </a:r>
-            <a:r>
-              <a:rPr lang="en-US" sz="1400" dirty="0" smtClean="0">
-                <a:solidFill>
-                  <a:schemeClr val="accent2"/>
-                </a:solidFill>
-                <a:latin typeface="Courier New" pitchFamily="49" charset="0"/>
-                <a:cs typeface="Courier New" pitchFamily="49" charset="0"/>
-              </a:rPr>
-              <a:t>P1DIR   </a:t>
-            </a:r>
-            <a:r>
-              <a:rPr lang="en-US" sz="1400" dirty="0" smtClean="0">
-                <a:solidFill>
-                  <a:srgbClr val="00B050"/>
-                </a:solidFill>
-                <a:latin typeface="Courier New" pitchFamily="49" charset="0"/>
-                <a:cs typeface="Courier New" pitchFamily="49" charset="0"/>
-              </a:rPr>
-              <a:t>; output pin </a:t>
-            </a:r>
-            <a:r>
-              <a:rPr lang="en-US" sz="1400" dirty="0" err="1" smtClean="0">
-                <a:solidFill>
-                  <a:srgbClr val="00B050"/>
-                </a:solidFill>
-                <a:latin typeface="Courier New" pitchFamily="49" charset="0"/>
-                <a:cs typeface="Courier New" pitchFamily="49" charset="0"/>
-              </a:rPr>
-              <a:t>dir</a:t>
-            </a:r>
-            <a:r>
-              <a:rPr lang="en-US" sz="1400" dirty="0" smtClean="0">
-                <a:solidFill>
-                  <a:srgbClr val="00B050"/>
-                </a:solidFill>
-                <a:latin typeface="Courier New" pitchFamily="49" charset="0"/>
-                <a:cs typeface="Courier New" pitchFamily="49" charset="0"/>
-              </a:rPr>
-              <a:t> (see next slide)</a:t>
-            </a:r>
-            <a:endParaRPr lang="en-US" sz="1400" dirty="0">
-              <a:solidFill>
-                <a:srgbClr val="00B050"/>
-              </a:solidFill>
-              <a:latin typeface="Courier New" pitchFamily="49" charset="0"/>
-              <a:cs typeface="Courier New" pitchFamily="49" charset="0"/>
-            </a:endParaRPr>
-          </a:p>
-          <a:p>
-            <a:pPr marL="0" indent="0">
-              <a:buNone/>
-            </a:pPr>
-            <a:r>
-              <a:rPr lang="en-US" sz="1400" dirty="0" smtClean="0">
-                <a:solidFill>
-                  <a:schemeClr val="accent2"/>
-                </a:solidFill>
-                <a:latin typeface="Courier New" pitchFamily="49" charset="0"/>
-                <a:cs typeface="Courier New" pitchFamily="49" charset="0"/>
-              </a:rPr>
-              <a:t>              </a:t>
-            </a:r>
-            <a:r>
-              <a:rPr lang="en-US" sz="1400" dirty="0" err="1" smtClean="0">
-                <a:solidFill>
-                  <a:schemeClr val="accent2"/>
-                </a:solidFill>
-                <a:latin typeface="Courier New" pitchFamily="49" charset="0"/>
-                <a:cs typeface="Courier New" pitchFamily="49" charset="0"/>
-              </a:rPr>
-              <a:t>bic.b</a:t>
-            </a:r>
-            <a:r>
-              <a:rPr lang="en-US" sz="1400" dirty="0" smtClean="0">
-                <a:solidFill>
-                  <a:schemeClr val="accent2"/>
-                </a:solidFill>
-                <a:latin typeface="Courier New" pitchFamily="49" charset="0"/>
-                <a:cs typeface="Courier New" pitchFamily="49" charset="0"/>
-              </a:rPr>
-              <a:t>  </a:t>
-            </a:r>
-            <a:r>
-              <a:rPr lang="en-US" sz="1400" dirty="0">
-                <a:solidFill>
-                  <a:schemeClr val="accent2"/>
-                </a:solidFill>
-                <a:latin typeface="Courier New" pitchFamily="49" charset="0"/>
-                <a:cs typeface="Courier New" pitchFamily="49" charset="0"/>
-              </a:rPr>
-              <a:t>#BIT3, &amp;</a:t>
-            </a:r>
-            <a:r>
-              <a:rPr lang="en-US" sz="1400" dirty="0" smtClean="0">
-                <a:solidFill>
-                  <a:schemeClr val="accent2"/>
-                </a:solidFill>
-                <a:latin typeface="Courier New" pitchFamily="49" charset="0"/>
-                <a:cs typeface="Courier New" pitchFamily="49" charset="0"/>
-              </a:rPr>
-              <a:t>P1DIR</a:t>
-            </a:r>
-            <a:r>
-              <a:rPr lang="en-US" sz="1400" dirty="0">
-                <a:solidFill>
-                  <a:srgbClr val="00B050"/>
-                </a:solidFill>
-                <a:latin typeface="Courier New" pitchFamily="49" charset="0"/>
-                <a:cs typeface="Courier New" pitchFamily="49" charset="0"/>
-              </a:rPr>
-              <a:t> </a:t>
-            </a:r>
-            <a:r>
-              <a:rPr lang="en-US" sz="1400" dirty="0" smtClean="0">
-                <a:solidFill>
-                  <a:srgbClr val="00B050"/>
-                </a:solidFill>
-                <a:latin typeface="Courier New" pitchFamily="49" charset="0"/>
-                <a:cs typeface="Courier New" pitchFamily="49" charset="0"/>
-              </a:rPr>
-              <a:t>       ; what is on pin 3? Input or output?</a:t>
-            </a:r>
-            <a:endParaRPr lang="en-US" sz="1400" dirty="0">
-              <a:solidFill>
-                <a:schemeClr val="accent2"/>
-              </a:solidFill>
-              <a:latin typeface="Courier New" pitchFamily="49" charset="0"/>
-              <a:cs typeface="Courier New" pitchFamily="49" charset="0"/>
-            </a:endParaRPr>
-          </a:p>
-          <a:p>
-            <a:pPr marL="0" indent="0">
-              <a:buNone/>
-            </a:pPr>
-            <a:r>
-              <a:rPr lang="en-US" sz="1400" dirty="0" smtClean="0">
-                <a:solidFill>
-                  <a:schemeClr val="accent2"/>
-                </a:solidFill>
-                <a:latin typeface="Courier New" pitchFamily="49" charset="0"/>
-                <a:cs typeface="Courier New" pitchFamily="49" charset="0"/>
-              </a:rPr>
-              <a:t>              </a:t>
-            </a:r>
-            <a:r>
-              <a:rPr lang="en-US" sz="1400" dirty="0" err="1" smtClean="0">
-                <a:solidFill>
-                  <a:schemeClr val="accent2"/>
-                </a:solidFill>
-                <a:latin typeface="Courier New" pitchFamily="49" charset="0"/>
-                <a:cs typeface="Courier New" pitchFamily="49" charset="0"/>
-              </a:rPr>
-              <a:t>bis.b</a:t>
-            </a:r>
-            <a:r>
-              <a:rPr lang="en-US" sz="1400" dirty="0" smtClean="0">
-                <a:solidFill>
-                  <a:schemeClr val="accent2"/>
-                </a:solidFill>
-                <a:latin typeface="Courier New" pitchFamily="49" charset="0"/>
-                <a:cs typeface="Courier New" pitchFamily="49" charset="0"/>
-              </a:rPr>
-              <a:t>  </a:t>
-            </a:r>
-            <a:r>
-              <a:rPr lang="en-US" sz="1400" dirty="0">
-                <a:solidFill>
-                  <a:schemeClr val="accent2"/>
-                </a:solidFill>
-                <a:latin typeface="Courier New" pitchFamily="49" charset="0"/>
-                <a:cs typeface="Courier New" pitchFamily="49" charset="0"/>
-              </a:rPr>
-              <a:t>#BIT3, &amp;</a:t>
-            </a:r>
-            <a:r>
-              <a:rPr lang="en-US" sz="1400" dirty="0" smtClean="0">
-                <a:solidFill>
-                  <a:schemeClr val="accent2"/>
-                </a:solidFill>
-                <a:latin typeface="Courier New" pitchFamily="49" charset="0"/>
-                <a:cs typeface="Courier New" pitchFamily="49" charset="0"/>
-              </a:rPr>
-              <a:t>P1REN        </a:t>
-            </a:r>
-            <a:r>
-              <a:rPr lang="en-US" sz="1400" dirty="0" smtClean="0">
-                <a:solidFill>
-                  <a:srgbClr val="00B050"/>
-                </a:solidFill>
-                <a:latin typeface="Courier New" pitchFamily="49" charset="0"/>
-                <a:cs typeface="Courier New" pitchFamily="49" charset="0"/>
-              </a:rPr>
-              <a:t>; enable pin 3’s resistor</a:t>
-            </a:r>
-            <a:endParaRPr lang="en-US" sz="1400" dirty="0">
-              <a:solidFill>
-                <a:schemeClr val="accent2"/>
-              </a:solidFill>
-              <a:latin typeface="Courier New" pitchFamily="49" charset="0"/>
-              <a:cs typeface="Courier New" pitchFamily="49" charset="0"/>
-            </a:endParaRPr>
-          </a:p>
-          <a:p>
-            <a:pPr marL="0" indent="0">
-              <a:buNone/>
-            </a:pPr>
-            <a:r>
-              <a:rPr lang="en-US" sz="1400" dirty="0" smtClean="0">
-                <a:solidFill>
-                  <a:schemeClr val="accent2"/>
-                </a:solidFill>
-                <a:latin typeface="Courier New" pitchFamily="49" charset="0"/>
-                <a:cs typeface="Courier New" pitchFamily="49" charset="0"/>
-              </a:rPr>
-              <a:t>              </a:t>
-            </a:r>
-            <a:r>
-              <a:rPr lang="en-US" sz="1400" dirty="0" err="1" smtClean="0">
-                <a:solidFill>
-                  <a:schemeClr val="accent2"/>
-                </a:solidFill>
-                <a:latin typeface="Courier New" pitchFamily="49" charset="0"/>
-                <a:cs typeface="Courier New" pitchFamily="49" charset="0"/>
-              </a:rPr>
-              <a:t>bis.b</a:t>
-            </a:r>
-            <a:r>
-              <a:rPr lang="en-US" sz="1400" dirty="0" smtClean="0">
-                <a:solidFill>
-                  <a:schemeClr val="accent2"/>
-                </a:solidFill>
-                <a:latin typeface="Courier New" pitchFamily="49" charset="0"/>
-                <a:cs typeface="Courier New" pitchFamily="49" charset="0"/>
-              </a:rPr>
-              <a:t>  </a:t>
-            </a:r>
-            <a:r>
-              <a:rPr lang="en-US" sz="1400" dirty="0">
-                <a:solidFill>
-                  <a:schemeClr val="accent2"/>
-                </a:solidFill>
-                <a:latin typeface="Courier New" pitchFamily="49" charset="0"/>
-                <a:cs typeface="Courier New" pitchFamily="49" charset="0"/>
-              </a:rPr>
-              <a:t>#BIT3, &amp;</a:t>
-            </a:r>
-            <a:r>
-              <a:rPr lang="en-US" sz="1400" dirty="0" smtClean="0">
-                <a:solidFill>
-                  <a:schemeClr val="accent2"/>
-                </a:solidFill>
-                <a:latin typeface="Courier New" pitchFamily="49" charset="0"/>
-                <a:cs typeface="Courier New" pitchFamily="49" charset="0"/>
-              </a:rPr>
-              <a:t>P1OUT        </a:t>
-            </a:r>
-            <a:r>
-              <a:rPr lang="en-US" sz="1400" dirty="0" smtClean="0">
-                <a:solidFill>
-                  <a:srgbClr val="00B050"/>
-                </a:solidFill>
-                <a:latin typeface="Courier New" pitchFamily="49" charset="0"/>
-                <a:cs typeface="Courier New" pitchFamily="49" charset="0"/>
-              </a:rPr>
-              <a:t>; pull-up or pull-down?</a:t>
-            </a:r>
-            <a:endParaRPr lang="en-US" sz="1400" dirty="0">
-              <a:solidFill>
-                <a:srgbClr val="00B050"/>
-              </a:solidFill>
-              <a:latin typeface="Courier New" pitchFamily="49" charset="0"/>
-              <a:cs typeface="Courier New" pitchFamily="49" charset="0"/>
-            </a:endParaRPr>
-          </a:p>
-          <a:p>
-            <a:pPr marL="0" indent="0">
-              <a:buNone/>
-            </a:pPr>
-            <a:endParaRPr lang="en-US" sz="1400" dirty="0">
-              <a:solidFill>
-                <a:schemeClr val="accent2"/>
-              </a:solidFill>
-              <a:latin typeface="Courier New" pitchFamily="49" charset="0"/>
-              <a:cs typeface="Courier New" pitchFamily="49" charset="0"/>
-            </a:endParaRPr>
-          </a:p>
-          <a:p>
-            <a:pPr marL="0" indent="0">
-              <a:buNone/>
-            </a:pPr>
-            <a:r>
-              <a:rPr lang="en-US" sz="1400" dirty="0" err="1">
-                <a:solidFill>
-                  <a:schemeClr val="accent2"/>
-                </a:solidFill>
-                <a:latin typeface="Courier New" pitchFamily="49" charset="0"/>
-                <a:cs typeface="Courier New" pitchFamily="49" charset="0"/>
-              </a:rPr>
-              <a:t>check_btn</a:t>
-            </a:r>
-            <a:r>
-              <a:rPr lang="en-US" sz="1400" dirty="0">
-                <a:solidFill>
-                  <a:schemeClr val="accent2"/>
-                </a:solidFill>
-                <a:latin typeface="Courier New" pitchFamily="49" charset="0"/>
-                <a:cs typeface="Courier New" pitchFamily="49" charset="0"/>
-              </a:rPr>
-              <a:t>:    </a:t>
-            </a:r>
-            <a:r>
-              <a:rPr lang="en-US" sz="1400" dirty="0" err="1">
-                <a:solidFill>
-                  <a:schemeClr val="accent2"/>
-                </a:solidFill>
-                <a:latin typeface="Courier New" pitchFamily="49" charset="0"/>
-                <a:cs typeface="Courier New" pitchFamily="49" charset="0"/>
-              </a:rPr>
-              <a:t>bit.b</a:t>
-            </a:r>
-            <a:r>
-              <a:rPr lang="en-US" sz="1400" dirty="0">
-                <a:solidFill>
-                  <a:schemeClr val="accent2"/>
-                </a:solidFill>
-                <a:latin typeface="Courier New" pitchFamily="49" charset="0"/>
-                <a:cs typeface="Courier New" pitchFamily="49" charset="0"/>
-              </a:rPr>
-              <a:t>  #BIT3, &amp;</a:t>
-            </a:r>
-            <a:r>
-              <a:rPr lang="en-US" sz="1400" dirty="0" smtClean="0">
-                <a:solidFill>
-                  <a:schemeClr val="accent2"/>
-                </a:solidFill>
-                <a:latin typeface="Courier New" pitchFamily="49" charset="0"/>
-                <a:cs typeface="Courier New" pitchFamily="49" charset="0"/>
-              </a:rPr>
-              <a:t>P1IN        </a:t>
-            </a:r>
-            <a:endParaRPr lang="en-US" sz="1400" dirty="0">
-              <a:solidFill>
-                <a:schemeClr val="accent2"/>
-              </a:solidFill>
-              <a:latin typeface="Courier New" pitchFamily="49" charset="0"/>
-              <a:cs typeface="Courier New" pitchFamily="49" charset="0"/>
-            </a:endParaRPr>
-          </a:p>
-          <a:p>
-            <a:pPr marL="0" indent="0">
-              <a:buNone/>
-            </a:pPr>
-            <a:r>
-              <a:rPr lang="en-US" sz="1400" dirty="0" smtClean="0">
-                <a:solidFill>
-                  <a:schemeClr val="accent2"/>
-                </a:solidFill>
-                <a:latin typeface="Courier New" pitchFamily="49" charset="0"/>
-                <a:cs typeface="Courier New" pitchFamily="49" charset="0"/>
-              </a:rPr>
-              <a:t>              </a:t>
-            </a:r>
-            <a:r>
-              <a:rPr lang="en-US" sz="1400" dirty="0" err="1" smtClean="0">
-                <a:solidFill>
-                  <a:schemeClr val="accent2"/>
-                </a:solidFill>
-                <a:latin typeface="Courier New" pitchFamily="49" charset="0"/>
-                <a:cs typeface="Courier New" pitchFamily="49" charset="0"/>
-              </a:rPr>
-              <a:t>jz</a:t>
-            </a:r>
-            <a:r>
-              <a:rPr lang="en-US" sz="1400" dirty="0" smtClean="0">
-                <a:solidFill>
-                  <a:schemeClr val="accent2"/>
-                </a:solidFill>
-                <a:latin typeface="Courier New" pitchFamily="49" charset="0"/>
-                <a:cs typeface="Courier New" pitchFamily="49" charset="0"/>
-              </a:rPr>
-              <a:t>     </a:t>
-            </a:r>
-            <a:r>
-              <a:rPr lang="en-US" sz="1400" dirty="0" err="1" smtClean="0">
-                <a:solidFill>
-                  <a:schemeClr val="accent2"/>
-                </a:solidFill>
-                <a:latin typeface="Courier New" pitchFamily="49" charset="0"/>
-                <a:cs typeface="Courier New" pitchFamily="49" charset="0"/>
-              </a:rPr>
-              <a:t>set_lights</a:t>
-            </a:r>
-            <a:endParaRPr lang="en-US" sz="1400" dirty="0">
-              <a:solidFill>
-                <a:schemeClr val="accent2"/>
-              </a:solidFill>
-              <a:latin typeface="Courier New" pitchFamily="49" charset="0"/>
-              <a:cs typeface="Courier New" pitchFamily="49" charset="0"/>
-            </a:endParaRPr>
-          </a:p>
-          <a:p>
-            <a:pPr marL="0" indent="0">
-              <a:buNone/>
-            </a:pPr>
-            <a:r>
-              <a:rPr lang="en-US" sz="1400" dirty="0" smtClean="0">
-                <a:solidFill>
-                  <a:schemeClr val="accent2"/>
-                </a:solidFill>
-                <a:latin typeface="Courier New" pitchFamily="49" charset="0"/>
-                <a:cs typeface="Courier New" pitchFamily="49" charset="0"/>
-              </a:rPr>
-              <a:t>              </a:t>
-            </a:r>
-            <a:r>
-              <a:rPr lang="en-US" sz="1400" dirty="0" err="1" smtClean="0">
-                <a:solidFill>
-                  <a:schemeClr val="accent2"/>
-                </a:solidFill>
-                <a:latin typeface="Courier New" pitchFamily="49" charset="0"/>
-                <a:cs typeface="Courier New" pitchFamily="49" charset="0"/>
-              </a:rPr>
-              <a:t>bic.b</a:t>
-            </a:r>
-            <a:r>
-              <a:rPr lang="en-US" sz="1400" dirty="0" smtClean="0">
-                <a:solidFill>
-                  <a:schemeClr val="accent2"/>
-                </a:solidFill>
-                <a:latin typeface="Courier New" pitchFamily="49" charset="0"/>
-                <a:cs typeface="Courier New" pitchFamily="49" charset="0"/>
-              </a:rPr>
-              <a:t>  </a:t>
-            </a:r>
-            <a:r>
-              <a:rPr lang="en-US" sz="1400" dirty="0">
-                <a:solidFill>
-                  <a:schemeClr val="accent2"/>
-                </a:solidFill>
-                <a:latin typeface="Courier New" pitchFamily="49" charset="0"/>
-                <a:cs typeface="Courier New" pitchFamily="49" charset="0"/>
-              </a:rPr>
-              <a:t>#BIT0|BIT6, &amp;P1OUT</a:t>
-            </a:r>
-          </a:p>
-          <a:p>
-            <a:pPr marL="0" indent="0">
-              <a:buNone/>
-            </a:pPr>
-            <a:r>
-              <a:rPr lang="en-US" sz="1400" dirty="0" smtClean="0">
-                <a:solidFill>
-                  <a:schemeClr val="accent2"/>
-                </a:solidFill>
-                <a:latin typeface="Courier New" pitchFamily="49" charset="0"/>
-                <a:cs typeface="Courier New" pitchFamily="49" charset="0"/>
-              </a:rPr>
-              <a:t>              </a:t>
-            </a:r>
-            <a:r>
-              <a:rPr lang="en-US" sz="1400" dirty="0" err="1" smtClean="0">
-                <a:solidFill>
-                  <a:schemeClr val="accent2"/>
-                </a:solidFill>
-                <a:latin typeface="Courier New" pitchFamily="49" charset="0"/>
-                <a:cs typeface="Courier New" pitchFamily="49" charset="0"/>
-              </a:rPr>
-              <a:t>jmp</a:t>
-            </a:r>
-            <a:r>
-              <a:rPr lang="en-US" sz="1400" dirty="0" smtClean="0">
-                <a:solidFill>
-                  <a:schemeClr val="accent2"/>
-                </a:solidFill>
-                <a:latin typeface="Courier New" pitchFamily="49" charset="0"/>
-                <a:cs typeface="Courier New" pitchFamily="49" charset="0"/>
-              </a:rPr>
-              <a:t>    </a:t>
-            </a:r>
-            <a:r>
-              <a:rPr lang="en-US" sz="1400" dirty="0" err="1" smtClean="0">
-                <a:solidFill>
-                  <a:schemeClr val="accent2"/>
-                </a:solidFill>
-                <a:latin typeface="Courier New" pitchFamily="49" charset="0"/>
-                <a:cs typeface="Courier New" pitchFamily="49" charset="0"/>
-              </a:rPr>
-              <a:t>check_btn</a:t>
-            </a:r>
-            <a:endParaRPr lang="en-US" sz="1400" dirty="0">
-              <a:solidFill>
-                <a:schemeClr val="accent2"/>
-              </a:solidFill>
-              <a:latin typeface="Courier New" pitchFamily="49" charset="0"/>
-              <a:cs typeface="Courier New" pitchFamily="49" charset="0"/>
-            </a:endParaRPr>
-          </a:p>
-          <a:p>
-            <a:pPr marL="0" indent="0">
-              <a:buNone/>
-            </a:pPr>
-            <a:r>
-              <a:rPr lang="en-US" sz="1400" dirty="0" err="1">
-                <a:solidFill>
-                  <a:schemeClr val="accent2"/>
-                </a:solidFill>
-                <a:latin typeface="Courier New" pitchFamily="49" charset="0"/>
-                <a:cs typeface="Courier New" pitchFamily="49" charset="0"/>
-              </a:rPr>
-              <a:t>set_lights</a:t>
-            </a:r>
-            <a:r>
-              <a:rPr lang="en-US" sz="1400" dirty="0">
-                <a:solidFill>
-                  <a:schemeClr val="accent2"/>
-                </a:solidFill>
-                <a:latin typeface="Courier New" pitchFamily="49" charset="0"/>
-                <a:cs typeface="Courier New" pitchFamily="49" charset="0"/>
-              </a:rPr>
-              <a:t>:   </a:t>
-            </a:r>
-            <a:r>
-              <a:rPr lang="en-US" sz="1400" dirty="0" err="1">
-                <a:solidFill>
-                  <a:schemeClr val="accent2"/>
-                </a:solidFill>
-                <a:latin typeface="Courier New" pitchFamily="49" charset="0"/>
-                <a:cs typeface="Courier New" pitchFamily="49" charset="0"/>
-              </a:rPr>
-              <a:t>bis.b</a:t>
-            </a:r>
-            <a:r>
-              <a:rPr lang="en-US" sz="1400" dirty="0">
-                <a:solidFill>
-                  <a:schemeClr val="accent2"/>
-                </a:solidFill>
-                <a:latin typeface="Courier New" pitchFamily="49" charset="0"/>
-                <a:cs typeface="Courier New" pitchFamily="49" charset="0"/>
-              </a:rPr>
-              <a:t>  #BIT0|BIT6, &amp;P1OUT</a:t>
-            </a:r>
-          </a:p>
-          <a:p>
-            <a:pPr marL="0" indent="0">
-              <a:buNone/>
-            </a:pPr>
-            <a:r>
-              <a:rPr lang="en-US" sz="1400" dirty="0" smtClean="0">
-                <a:solidFill>
-                  <a:schemeClr val="accent2"/>
-                </a:solidFill>
-                <a:latin typeface="Courier New" pitchFamily="49" charset="0"/>
-                <a:cs typeface="Courier New" pitchFamily="49" charset="0"/>
-              </a:rPr>
-              <a:t>              </a:t>
-            </a:r>
-            <a:r>
-              <a:rPr lang="en-US" sz="1400" dirty="0" err="1" smtClean="0">
-                <a:solidFill>
-                  <a:schemeClr val="accent2"/>
-                </a:solidFill>
-                <a:latin typeface="Courier New" pitchFamily="49" charset="0"/>
-                <a:cs typeface="Courier New" pitchFamily="49" charset="0"/>
-              </a:rPr>
-              <a:t>jmp</a:t>
-            </a:r>
-            <a:r>
-              <a:rPr lang="en-US" sz="1400" dirty="0" smtClean="0">
-                <a:solidFill>
-                  <a:schemeClr val="accent2"/>
-                </a:solidFill>
-                <a:latin typeface="Courier New" pitchFamily="49" charset="0"/>
-                <a:cs typeface="Courier New" pitchFamily="49" charset="0"/>
-              </a:rPr>
-              <a:t>    </a:t>
-            </a:r>
-            <a:r>
-              <a:rPr lang="en-US" sz="1400" dirty="0" err="1" smtClean="0">
-                <a:solidFill>
-                  <a:schemeClr val="accent2"/>
-                </a:solidFill>
-                <a:latin typeface="Courier New" pitchFamily="49" charset="0"/>
-                <a:cs typeface="Courier New" pitchFamily="49" charset="0"/>
-              </a:rPr>
-              <a:t>check_btn</a:t>
-            </a:r>
-            <a:endParaRPr lang="en-US" sz="1400" dirty="0" smtClean="0">
-              <a:solidFill>
-                <a:schemeClr val="accent2"/>
-              </a:solidFill>
-              <a:latin typeface="Courier New" pitchFamily="49" charset="0"/>
-              <a:cs typeface="Courier New" pitchFamily="49" charset="0"/>
-            </a:endParaRPr>
-          </a:p>
-        </p:txBody>
-      </p:sp>
-      <p:pic>
-        <p:nvPicPr>
-          <p:cNvPr id="4" name="Picture 3"/>
-          <p:cNvPicPr>
-            <a:picLocks noChangeAspect="1"/>
-          </p:cNvPicPr>
-          <p:nvPr/>
-        </p:nvPicPr>
-        <p:blipFill>
-          <a:blip r:embed="rId2">
-            <a:extLst>
-              <a:ext uri="{28A0092B-C50C-407E-A947-70E740481C1C}">
-                <a14:useLocalDpi xmlns:a14="http://schemas.microsoft.com/office/drawing/2010/main" val="0"/>
-              </a:ext>
-            </a:extLst>
-          </a:blip>
-          <a:stretch>
-            <a:fillRect/>
-          </a:stretch>
-        </p:blipFill>
-        <p:spPr>
-          <a:xfrm>
-            <a:off x="1729308" y="1482963"/>
-            <a:ext cx="4350651" cy="1655201"/>
-          </a:xfrm>
-          <a:prstGeom prst="rect">
-            <a:avLst/>
-          </a:prstGeom>
-        </p:spPr>
-      </p:pic>
-      <p:sp>
-        <p:nvSpPr>
-          <p:cNvPr id="5" name="Right Brace 4"/>
-          <p:cNvSpPr/>
-          <p:nvPr/>
-        </p:nvSpPr>
-        <p:spPr bwMode="auto">
-          <a:xfrm>
-            <a:off x="4603808" y="4318093"/>
-            <a:ext cx="512379" cy="1347952"/>
-          </a:xfrm>
-          <a:prstGeom prst="rightBrace">
-            <a:avLst/>
-          </a:prstGeom>
-          <a:noFill/>
-          <a:ln w="12700" cap="flat" cmpd="sng" algn="ctr">
-            <a:solidFill>
-              <a:schemeClr val="tx1"/>
-            </a:solidFill>
-            <a:prstDash val="solid"/>
-            <a:round/>
-            <a:headEnd type="none" w="med" len="med"/>
-            <a:tailEnd type="none" w="med" len="med"/>
-          </a:ln>
-          <a:effectLst/>
-        </p:spPr>
-        <p:txBody>
-          <a:bodyPr vert="horz" wrap="square" lIns="91440" tIns="45720" rIns="91440" bIns="45720" numCol="1" rtlCol="0" anchor="t" anchorCtr="0" compatLnSpc="1">
-            <a:prstTxWarp prst="textNoShape">
-              <a:avLst/>
-            </a:prstTxWarp>
-          </a:bodyPr>
-          <a:lstStyle/>
-          <a:p>
-            <a:pPr marL="0" marR="0" indent="0" algn="ctr" defTabSz="914400" rtl="0" eaLnBrk="0" fontAlgn="base" latinLnBrk="0" hangingPunct="0">
-              <a:lnSpc>
-                <a:spcPct val="100000"/>
-              </a:lnSpc>
-              <a:spcBef>
-                <a:spcPct val="0"/>
-              </a:spcBef>
-              <a:spcAft>
-                <a:spcPct val="0"/>
-              </a:spcAft>
-              <a:buClrTx/>
-              <a:buSzTx/>
-              <a:buFontTx/>
-              <a:buNone/>
-              <a:tabLst/>
-            </a:pPr>
-            <a:endParaRPr kumimoji="0" lang="en-US" sz="1600" b="0" i="0" u="none" strike="noStrike" cap="none" normalizeH="0" baseline="0" smtClean="0">
-              <a:ln>
-                <a:noFill/>
-              </a:ln>
-              <a:solidFill>
-                <a:schemeClr val="tx1"/>
-              </a:solidFill>
-              <a:effectLst/>
-              <a:latin typeface="Arial" charset="0"/>
-            </a:endParaRPr>
-          </a:p>
-        </p:txBody>
-      </p:sp>
-      <p:sp>
-        <p:nvSpPr>
-          <p:cNvPr id="6" name="TextBox 5"/>
-          <p:cNvSpPr txBox="1"/>
-          <p:nvPr/>
-        </p:nvSpPr>
-        <p:spPr>
-          <a:xfrm>
-            <a:off x="5116187" y="4761236"/>
-            <a:ext cx="3036409" cy="461665"/>
-          </a:xfrm>
-          <a:prstGeom prst="rect">
-            <a:avLst/>
-          </a:prstGeom>
-          <a:noFill/>
-        </p:spPr>
-        <p:txBody>
-          <a:bodyPr wrap="none" rtlCol="0">
-            <a:spAutoFit/>
-          </a:bodyPr>
-          <a:lstStyle/>
-          <a:p>
-            <a:r>
-              <a:rPr lang="en-US" dirty="0" smtClean="0"/>
-              <a:t>What is going on here?</a:t>
-            </a:r>
-            <a:endParaRPr lang="en-US" dirty="0"/>
-          </a:p>
-        </p:txBody>
-      </p:sp>
-      <p:sp>
-        <p:nvSpPr>
-          <p:cNvPr id="7" name="Rectangle 6"/>
-          <p:cNvSpPr/>
-          <p:nvPr/>
-        </p:nvSpPr>
-        <p:spPr bwMode="auto">
-          <a:xfrm>
-            <a:off x="922421" y="5927559"/>
-            <a:ext cx="7230175" cy="433136"/>
-          </a:xfrm>
-          <a:prstGeom prst="rect">
-            <a:avLst/>
-          </a:prstGeom>
-          <a:solidFill>
-            <a:srgbClr val="0C2D83"/>
-          </a:solidFill>
-          <a:ln w="12700" cap="flat" cmpd="sng" algn="ctr">
-            <a:solidFill>
-              <a:schemeClr val="accent6">
-                <a:lumMod val="40000"/>
-                <a:lumOff val="60000"/>
-              </a:schemeClr>
-            </a:solidFill>
-            <a:prstDash val="solid"/>
-            <a:round/>
-            <a:headEnd type="none" w="med" len="med"/>
-            <a:tailEnd type="none" w="med" len="med"/>
-          </a:ln>
-          <a:effectLst/>
-        </p:spPr>
-        <p:txBody>
-          <a:bodyPr vert="horz" wrap="square" lIns="91440" tIns="45720" rIns="91440" bIns="45720" numCol="1" rtlCol="0" anchor="ctr" anchorCtr="0" compatLnSpc="1">
-            <a:prstTxWarp prst="textNoShape">
-              <a:avLst/>
-            </a:prstTxWarp>
-          </a:bodyPr>
-          <a:lstStyle/>
-          <a:p>
-            <a:pPr marL="0" marR="0" indent="0" algn="ctr" defTabSz="914400" rtl="0" eaLnBrk="0" fontAlgn="base" latinLnBrk="0" hangingPunct="0">
-              <a:lnSpc>
-                <a:spcPct val="100000"/>
-              </a:lnSpc>
-              <a:spcBef>
-                <a:spcPct val="0"/>
-              </a:spcBef>
-              <a:spcAft>
-                <a:spcPct val="0"/>
-              </a:spcAft>
-              <a:buClrTx/>
-              <a:buSzTx/>
-              <a:buFontTx/>
-              <a:buNone/>
-              <a:tabLst/>
-            </a:pPr>
-            <a:r>
-              <a:rPr kumimoji="0" lang="en-US" sz="1600" b="0" i="0" u="none" strike="noStrike" cap="none" normalizeH="0" baseline="0" dirty="0" smtClean="0">
-                <a:ln>
-                  <a:noFill/>
-                </a:ln>
-                <a:solidFill>
-                  <a:schemeClr val="bg1"/>
-                </a:solidFill>
-                <a:effectLst/>
-                <a:latin typeface="Arial" charset="0"/>
-              </a:rPr>
-              <a:t>Time permitting, let’s run this on your processor</a:t>
-            </a:r>
-          </a:p>
-        </p:txBody>
-      </p:sp>
-    </p:spTree>
-    <p:extLst>
-      <p:ext uri="{BB962C8B-B14F-4D97-AF65-F5344CB8AC3E}">
-        <p14:creationId xmlns:p14="http://schemas.microsoft.com/office/powerpoint/2010/main" val="1575778019"/>
-      </p:ext>
-    </p:extLst>
-  </p:cSld>
-  <p:clrMapOvr>
-    <a:masterClrMapping/>
-  </p:clrMapOvr>
-  <p:timing>
-    <p:tnLst>
-      <p:par>
-        <p:cTn id="1" dur="indefinite" restart="never" nodeType="tmRoot"/>
-      </p:par>
-    </p:tnLst>
-  </p:timing>
-</p:sld>
-</file>
-
-<file path=ppt/slides/slide15.xml><?xml version="1.0" encoding="utf-8"?>
-<p:sld xmlns:a="http://schemas.openxmlformats.org/drawingml/2006/main" xmlns:r="http://schemas.openxmlformats.org/officeDocument/2006/relationships" xmlns:p="http://schemas.openxmlformats.org/presentationml/2006/main">
-  <p:cSld>
-    <p:spTree>
-      <p:nvGrpSpPr>
-        <p:cNvPr id="1" name=""/>
-        <p:cNvGrpSpPr/>
-        <p:nvPr/>
-      </p:nvGrpSpPr>
-      <p:grpSpPr>
-        <a:xfrm>
-          <a:off x="0" y="0"/>
-          <a:ext cx="0" cy="0"/>
-          <a:chOff x="0" y="0"/>
-          <a:chExt cx="0" cy="0"/>
-        </a:xfrm>
-      </p:grpSpPr>
-      <p:sp>
-        <p:nvSpPr>
-          <p:cNvPr id="2" name="Title 1"/>
-          <p:cNvSpPr>
-            <a:spLocks noGrp="1"/>
-          </p:cNvSpPr>
-          <p:nvPr>
-            <p:ph type="title"/>
-          </p:nvPr>
-        </p:nvSpPr>
-        <p:spPr/>
-        <p:txBody>
-          <a:bodyPr/>
-          <a:lstStyle/>
-          <a:p>
-            <a:r>
-              <a:rPr lang="en-US" b="1" dirty="0" smtClean="0"/>
               <a:t>Toggle LED</a:t>
             </a:r>
             <a:endParaRPr lang="en-US" dirty="0"/>
@@ -11121,6 +10098,1073 @@
     <p:extLst>
       <p:ext uri="{BB962C8B-B14F-4D97-AF65-F5344CB8AC3E}">
         <p14:creationId xmlns:p14="http://schemas.microsoft.com/office/powerpoint/2010/main" val="3783551276"/>
+      </p:ext>
+    </p:extLst>
+  </p:cSld>
+  <p:clrMapOvr>
+    <a:masterClrMapping/>
+  </p:clrMapOvr>
+  <p:timing>
+    <p:tnLst>
+      <p:par>
+        <p:cTn id="1" dur="indefinite" restart="never" nodeType="tmRoot"/>
+      </p:par>
+    </p:tnLst>
+  </p:timing>
+</p:sld>
+</file>
+
+<file path=ppt/slides/slide15.xml><?xml version="1.0" encoding="utf-8"?>
+<p:sld xmlns:a="http://schemas.openxmlformats.org/drawingml/2006/main" xmlns:r="http://schemas.openxmlformats.org/officeDocument/2006/relationships" xmlns:p="http://schemas.openxmlformats.org/presentationml/2006/main">
+  <p:cSld>
+    <p:spTree>
+      <p:nvGrpSpPr>
+        <p:cNvPr id="1" name=""/>
+        <p:cNvGrpSpPr/>
+        <p:nvPr/>
+      </p:nvGrpSpPr>
+      <p:grpSpPr>
+        <a:xfrm>
+          <a:off x="0" y="0"/>
+          <a:ext cx="0" cy="0"/>
+          <a:chOff x="0" y="0"/>
+          <a:chExt cx="0" cy="0"/>
+        </a:xfrm>
+      </p:grpSpPr>
+      <p:sp>
+        <p:nvSpPr>
+          <p:cNvPr id="2" name="Title 1"/>
+          <p:cNvSpPr>
+            <a:spLocks noGrp="1"/>
+          </p:cNvSpPr>
+          <p:nvPr>
+            <p:ph type="title"/>
+          </p:nvPr>
+        </p:nvSpPr>
+        <p:spPr/>
+        <p:txBody>
+          <a:bodyPr/>
+          <a:lstStyle/>
+          <a:p>
+            <a:r>
+              <a:rPr lang="en-US" b="1" dirty="0" smtClean="0"/>
+              <a:t>Example Program</a:t>
+            </a:r>
+            <a:endParaRPr lang="en-US" dirty="0"/>
+          </a:p>
+        </p:txBody>
+      </p:sp>
+      <p:sp>
+        <p:nvSpPr>
+          <p:cNvPr id="3" name="Content Placeholder 2"/>
+          <p:cNvSpPr>
+            <a:spLocks noGrp="1"/>
+          </p:cNvSpPr>
+          <p:nvPr>
+            <p:ph idx="1"/>
+          </p:nvPr>
+        </p:nvSpPr>
+        <p:spPr>
+          <a:xfrm>
+            <a:off x="369127" y="1543385"/>
+            <a:ext cx="8083562" cy="4384174"/>
+          </a:xfrm>
+        </p:spPr>
+        <p:txBody>
+          <a:bodyPr>
+            <a:normAutofit fontScale="92500" lnSpcReduction="10000"/>
+          </a:bodyPr>
+          <a:lstStyle/>
+          <a:p>
+            <a:pPr marL="0" indent="0">
+              <a:buNone/>
+            </a:pPr>
+            <a:endParaRPr lang="en-US" sz="1400" dirty="0" smtClean="0">
+              <a:solidFill>
+                <a:schemeClr val="accent2"/>
+              </a:solidFill>
+              <a:latin typeface="Courier New" pitchFamily="49" charset="0"/>
+              <a:cs typeface="Courier New" pitchFamily="49" charset="0"/>
+            </a:endParaRPr>
+          </a:p>
+          <a:p>
+            <a:pPr marL="0" indent="0">
+              <a:buNone/>
+            </a:pPr>
+            <a:endParaRPr lang="en-US" sz="1400" dirty="0">
+              <a:solidFill>
+                <a:schemeClr val="accent2"/>
+              </a:solidFill>
+              <a:latin typeface="Courier New" pitchFamily="49" charset="0"/>
+              <a:cs typeface="Courier New" pitchFamily="49" charset="0"/>
+            </a:endParaRPr>
+          </a:p>
+          <a:p>
+            <a:pPr marL="0" indent="0">
+              <a:buNone/>
+            </a:pPr>
+            <a:endParaRPr lang="en-US" sz="1400" dirty="0" smtClean="0">
+              <a:solidFill>
+                <a:schemeClr val="accent2"/>
+              </a:solidFill>
+              <a:latin typeface="Courier New" pitchFamily="49" charset="0"/>
+              <a:cs typeface="Courier New" pitchFamily="49" charset="0"/>
+            </a:endParaRPr>
+          </a:p>
+          <a:p>
+            <a:pPr marL="0" indent="0">
+              <a:buNone/>
+            </a:pPr>
+            <a:endParaRPr lang="en-US" sz="1400" dirty="0">
+              <a:solidFill>
+                <a:schemeClr val="accent2"/>
+              </a:solidFill>
+              <a:latin typeface="Courier New" pitchFamily="49" charset="0"/>
+              <a:cs typeface="Courier New" pitchFamily="49" charset="0"/>
+            </a:endParaRPr>
+          </a:p>
+          <a:p>
+            <a:pPr marL="0" indent="0">
+              <a:buNone/>
+            </a:pPr>
+            <a:endParaRPr lang="en-US" sz="1400" dirty="0" smtClean="0">
+              <a:solidFill>
+                <a:schemeClr val="accent2"/>
+              </a:solidFill>
+              <a:latin typeface="Courier New" pitchFamily="49" charset="0"/>
+              <a:cs typeface="Courier New" pitchFamily="49" charset="0"/>
+            </a:endParaRPr>
+          </a:p>
+          <a:p>
+            <a:pPr marL="0" indent="0">
+              <a:buNone/>
+            </a:pPr>
+            <a:endParaRPr lang="en-US" sz="1400" dirty="0">
+              <a:solidFill>
+                <a:schemeClr val="accent2"/>
+              </a:solidFill>
+              <a:latin typeface="Courier New" pitchFamily="49" charset="0"/>
+              <a:cs typeface="Courier New" pitchFamily="49" charset="0"/>
+            </a:endParaRPr>
+          </a:p>
+          <a:p>
+            <a:pPr marL="0" indent="0">
+              <a:buNone/>
+            </a:pPr>
+            <a:endParaRPr lang="en-US" sz="1400" dirty="0" smtClean="0">
+              <a:solidFill>
+                <a:schemeClr val="accent2"/>
+              </a:solidFill>
+              <a:latin typeface="Courier New" pitchFamily="49" charset="0"/>
+              <a:cs typeface="Courier New" pitchFamily="49" charset="0"/>
+            </a:endParaRPr>
+          </a:p>
+          <a:p>
+            <a:pPr marL="0" indent="0">
+              <a:buNone/>
+            </a:pPr>
+            <a:endParaRPr lang="en-US" sz="1400" dirty="0">
+              <a:solidFill>
+                <a:schemeClr val="accent2"/>
+              </a:solidFill>
+              <a:latin typeface="Courier New" pitchFamily="49" charset="0"/>
+              <a:cs typeface="Courier New" pitchFamily="49" charset="0"/>
+            </a:endParaRPr>
+          </a:p>
+          <a:p>
+            <a:pPr marL="0" indent="0">
+              <a:buNone/>
+            </a:pPr>
+            <a:r>
+              <a:rPr lang="en-US" sz="1400" dirty="0" smtClean="0">
+                <a:solidFill>
+                  <a:schemeClr val="accent2"/>
+                </a:solidFill>
+                <a:latin typeface="Courier New" pitchFamily="49" charset="0"/>
+                <a:cs typeface="Courier New" pitchFamily="49" charset="0"/>
+              </a:rPr>
+              <a:t>              </a:t>
+            </a:r>
+            <a:r>
+              <a:rPr lang="en-US" sz="1400" dirty="0" err="1" smtClean="0">
+                <a:solidFill>
+                  <a:schemeClr val="accent2"/>
+                </a:solidFill>
+                <a:latin typeface="Courier New" pitchFamily="49" charset="0"/>
+                <a:cs typeface="Courier New" pitchFamily="49" charset="0"/>
+              </a:rPr>
+              <a:t>bis.b</a:t>
+            </a:r>
+            <a:r>
+              <a:rPr lang="en-US" sz="1400" dirty="0" smtClean="0">
+                <a:solidFill>
+                  <a:schemeClr val="accent2"/>
+                </a:solidFill>
+                <a:latin typeface="Courier New" pitchFamily="49" charset="0"/>
+                <a:cs typeface="Courier New" pitchFamily="49" charset="0"/>
+              </a:rPr>
+              <a:t>  </a:t>
+            </a:r>
+            <a:r>
+              <a:rPr lang="en-US" sz="1400" dirty="0">
+                <a:solidFill>
+                  <a:schemeClr val="accent2"/>
+                </a:solidFill>
+                <a:latin typeface="Courier New" pitchFamily="49" charset="0"/>
+                <a:cs typeface="Courier New" pitchFamily="49" charset="0"/>
+              </a:rPr>
+              <a:t>#BIT0|BIT6, &amp;</a:t>
+            </a:r>
+            <a:r>
+              <a:rPr lang="en-US" sz="1400" dirty="0" smtClean="0">
+                <a:solidFill>
+                  <a:schemeClr val="accent2"/>
+                </a:solidFill>
+                <a:latin typeface="Courier New" pitchFamily="49" charset="0"/>
+                <a:cs typeface="Courier New" pitchFamily="49" charset="0"/>
+              </a:rPr>
+              <a:t>P1DIR   </a:t>
+            </a:r>
+            <a:r>
+              <a:rPr lang="en-US" sz="1400" dirty="0" smtClean="0">
+                <a:solidFill>
+                  <a:srgbClr val="00B050"/>
+                </a:solidFill>
+                <a:latin typeface="Courier New" pitchFamily="49" charset="0"/>
+                <a:cs typeface="Courier New" pitchFamily="49" charset="0"/>
+              </a:rPr>
+              <a:t>; output pin </a:t>
+            </a:r>
+            <a:r>
+              <a:rPr lang="en-US" sz="1400" dirty="0" err="1" smtClean="0">
+                <a:solidFill>
+                  <a:srgbClr val="00B050"/>
+                </a:solidFill>
+                <a:latin typeface="Courier New" pitchFamily="49" charset="0"/>
+                <a:cs typeface="Courier New" pitchFamily="49" charset="0"/>
+              </a:rPr>
+              <a:t>dir</a:t>
+            </a:r>
+            <a:r>
+              <a:rPr lang="en-US" sz="1400" dirty="0" smtClean="0">
+                <a:solidFill>
+                  <a:srgbClr val="00B050"/>
+                </a:solidFill>
+                <a:latin typeface="Courier New" pitchFamily="49" charset="0"/>
+                <a:cs typeface="Courier New" pitchFamily="49" charset="0"/>
+              </a:rPr>
+              <a:t> (see </a:t>
+            </a:r>
+            <a:r>
+              <a:rPr lang="en-US" sz="1400" dirty="0" smtClean="0">
+                <a:solidFill>
+                  <a:srgbClr val="00B050"/>
+                </a:solidFill>
+                <a:latin typeface="Courier New" pitchFamily="49" charset="0"/>
+                <a:cs typeface="Courier New" pitchFamily="49" charset="0"/>
+              </a:rPr>
+              <a:t>previous slide</a:t>
+            </a:r>
+            <a:r>
+              <a:rPr lang="en-US" sz="1400" dirty="0" smtClean="0">
+                <a:solidFill>
+                  <a:srgbClr val="00B050"/>
+                </a:solidFill>
+                <a:latin typeface="Courier New" pitchFamily="49" charset="0"/>
+                <a:cs typeface="Courier New" pitchFamily="49" charset="0"/>
+              </a:rPr>
+              <a:t>)</a:t>
+            </a:r>
+            <a:endParaRPr lang="en-US" sz="1400" dirty="0">
+              <a:solidFill>
+                <a:srgbClr val="00B050"/>
+              </a:solidFill>
+              <a:latin typeface="Courier New" pitchFamily="49" charset="0"/>
+              <a:cs typeface="Courier New" pitchFamily="49" charset="0"/>
+            </a:endParaRPr>
+          </a:p>
+          <a:p>
+            <a:pPr marL="0" indent="0">
+              <a:buNone/>
+            </a:pPr>
+            <a:r>
+              <a:rPr lang="en-US" sz="1400" dirty="0" smtClean="0">
+                <a:solidFill>
+                  <a:schemeClr val="accent2"/>
+                </a:solidFill>
+                <a:latin typeface="Courier New" pitchFamily="49" charset="0"/>
+                <a:cs typeface="Courier New" pitchFamily="49" charset="0"/>
+              </a:rPr>
+              <a:t>              </a:t>
+            </a:r>
+            <a:r>
+              <a:rPr lang="en-US" sz="1400" dirty="0" err="1" smtClean="0">
+                <a:solidFill>
+                  <a:schemeClr val="accent2"/>
+                </a:solidFill>
+                <a:latin typeface="Courier New" pitchFamily="49" charset="0"/>
+                <a:cs typeface="Courier New" pitchFamily="49" charset="0"/>
+              </a:rPr>
+              <a:t>bic.b</a:t>
+            </a:r>
+            <a:r>
+              <a:rPr lang="en-US" sz="1400" dirty="0" smtClean="0">
+                <a:solidFill>
+                  <a:schemeClr val="accent2"/>
+                </a:solidFill>
+                <a:latin typeface="Courier New" pitchFamily="49" charset="0"/>
+                <a:cs typeface="Courier New" pitchFamily="49" charset="0"/>
+              </a:rPr>
+              <a:t>  </a:t>
+            </a:r>
+            <a:r>
+              <a:rPr lang="en-US" sz="1400" dirty="0">
+                <a:solidFill>
+                  <a:schemeClr val="accent2"/>
+                </a:solidFill>
+                <a:latin typeface="Courier New" pitchFamily="49" charset="0"/>
+                <a:cs typeface="Courier New" pitchFamily="49" charset="0"/>
+              </a:rPr>
+              <a:t>#BIT3, &amp;</a:t>
+            </a:r>
+            <a:r>
+              <a:rPr lang="en-US" sz="1400" dirty="0" smtClean="0">
+                <a:solidFill>
+                  <a:schemeClr val="accent2"/>
+                </a:solidFill>
+                <a:latin typeface="Courier New" pitchFamily="49" charset="0"/>
+                <a:cs typeface="Courier New" pitchFamily="49" charset="0"/>
+              </a:rPr>
+              <a:t>P1DIR</a:t>
+            </a:r>
+            <a:r>
+              <a:rPr lang="en-US" sz="1400" dirty="0">
+                <a:solidFill>
+                  <a:srgbClr val="00B050"/>
+                </a:solidFill>
+                <a:latin typeface="Courier New" pitchFamily="49" charset="0"/>
+                <a:cs typeface="Courier New" pitchFamily="49" charset="0"/>
+              </a:rPr>
+              <a:t> </a:t>
+            </a:r>
+            <a:r>
+              <a:rPr lang="en-US" sz="1400" dirty="0" smtClean="0">
+                <a:solidFill>
+                  <a:srgbClr val="00B050"/>
+                </a:solidFill>
+                <a:latin typeface="Courier New" pitchFamily="49" charset="0"/>
+                <a:cs typeface="Courier New" pitchFamily="49" charset="0"/>
+              </a:rPr>
+              <a:t>       ; what is on pin 3? Input or output?</a:t>
+            </a:r>
+            <a:endParaRPr lang="en-US" sz="1400" dirty="0">
+              <a:solidFill>
+                <a:schemeClr val="accent2"/>
+              </a:solidFill>
+              <a:latin typeface="Courier New" pitchFamily="49" charset="0"/>
+              <a:cs typeface="Courier New" pitchFamily="49" charset="0"/>
+            </a:endParaRPr>
+          </a:p>
+          <a:p>
+            <a:pPr marL="0" indent="0">
+              <a:buNone/>
+            </a:pPr>
+            <a:r>
+              <a:rPr lang="en-US" sz="1400" dirty="0" smtClean="0">
+                <a:solidFill>
+                  <a:schemeClr val="accent2"/>
+                </a:solidFill>
+                <a:latin typeface="Courier New" pitchFamily="49" charset="0"/>
+                <a:cs typeface="Courier New" pitchFamily="49" charset="0"/>
+              </a:rPr>
+              <a:t>              </a:t>
+            </a:r>
+            <a:r>
+              <a:rPr lang="en-US" sz="1400" dirty="0" err="1" smtClean="0">
+                <a:solidFill>
+                  <a:schemeClr val="accent2"/>
+                </a:solidFill>
+                <a:latin typeface="Courier New" pitchFamily="49" charset="0"/>
+                <a:cs typeface="Courier New" pitchFamily="49" charset="0"/>
+              </a:rPr>
+              <a:t>bis.b</a:t>
+            </a:r>
+            <a:r>
+              <a:rPr lang="en-US" sz="1400" dirty="0" smtClean="0">
+                <a:solidFill>
+                  <a:schemeClr val="accent2"/>
+                </a:solidFill>
+                <a:latin typeface="Courier New" pitchFamily="49" charset="0"/>
+                <a:cs typeface="Courier New" pitchFamily="49" charset="0"/>
+              </a:rPr>
+              <a:t>  </a:t>
+            </a:r>
+            <a:r>
+              <a:rPr lang="en-US" sz="1400" dirty="0">
+                <a:solidFill>
+                  <a:schemeClr val="accent2"/>
+                </a:solidFill>
+                <a:latin typeface="Courier New" pitchFamily="49" charset="0"/>
+                <a:cs typeface="Courier New" pitchFamily="49" charset="0"/>
+              </a:rPr>
+              <a:t>#BIT3, &amp;</a:t>
+            </a:r>
+            <a:r>
+              <a:rPr lang="en-US" sz="1400" dirty="0" smtClean="0">
+                <a:solidFill>
+                  <a:schemeClr val="accent2"/>
+                </a:solidFill>
+                <a:latin typeface="Courier New" pitchFamily="49" charset="0"/>
+                <a:cs typeface="Courier New" pitchFamily="49" charset="0"/>
+              </a:rPr>
+              <a:t>P1REN        </a:t>
+            </a:r>
+            <a:r>
+              <a:rPr lang="en-US" sz="1400" dirty="0" smtClean="0">
+                <a:solidFill>
+                  <a:srgbClr val="00B050"/>
+                </a:solidFill>
+                <a:latin typeface="Courier New" pitchFamily="49" charset="0"/>
+                <a:cs typeface="Courier New" pitchFamily="49" charset="0"/>
+              </a:rPr>
+              <a:t>; enable pin 3’s resistor</a:t>
+            </a:r>
+            <a:endParaRPr lang="en-US" sz="1400" dirty="0">
+              <a:solidFill>
+                <a:schemeClr val="accent2"/>
+              </a:solidFill>
+              <a:latin typeface="Courier New" pitchFamily="49" charset="0"/>
+              <a:cs typeface="Courier New" pitchFamily="49" charset="0"/>
+            </a:endParaRPr>
+          </a:p>
+          <a:p>
+            <a:pPr marL="0" indent="0">
+              <a:buNone/>
+            </a:pPr>
+            <a:r>
+              <a:rPr lang="en-US" sz="1400" dirty="0" smtClean="0">
+                <a:solidFill>
+                  <a:schemeClr val="accent2"/>
+                </a:solidFill>
+                <a:latin typeface="Courier New" pitchFamily="49" charset="0"/>
+                <a:cs typeface="Courier New" pitchFamily="49" charset="0"/>
+              </a:rPr>
+              <a:t>              </a:t>
+            </a:r>
+            <a:r>
+              <a:rPr lang="en-US" sz="1400" dirty="0" err="1" smtClean="0">
+                <a:solidFill>
+                  <a:schemeClr val="accent2"/>
+                </a:solidFill>
+                <a:latin typeface="Courier New" pitchFamily="49" charset="0"/>
+                <a:cs typeface="Courier New" pitchFamily="49" charset="0"/>
+              </a:rPr>
+              <a:t>bis.b</a:t>
+            </a:r>
+            <a:r>
+              <a:rPr lang="en-US" sz="1400" dirty="0" smtClean="0">
+                <a:solidFill>
+                  <a:schemeClr val="accent2"/>
+                </a:solidFill>
+                <a:latin typeface="Courier New" pitchFamily="49" charset="0"/>
+                <a:cs typeface="Courier New" pitchFamily="49" charset="0"/>
+              </a:rPr>
+              <a:t>  </a:t>
+            </a:r>
+            <a:r>
+              <a:rPr lang="en-US" sz="1400" dirty="0">
+                <a:solidFill>
+                  <a:schemeClr val="accent2"/>
+                </a:solidFill>
+                <a:latin typeface="Courier New" pitchFamily="49" charset="0"/>
+                <a:cs typeface="Courier New" pitchFamily="49" charset="0"/>
+              </a:rPr>
+              <a:t>#BIT3, &amp;</a:t>
+            </a:r>
+            <a:r>
+              <a:rPr lang="en-US" sz="1400" dirty="0" smtClean="0">
+                <a:solidFill>
+                  <a:schemeClr val="accent2"/>
+                </a:solidFill>
+                <a:latin typeface="Courier New" pitchFamily="49" charset="0"/>
+                <a:cs typeface="Courier New" pitchFamily="49" charset="0"/>
+              </a:rPr>
+              <a:t>P1OUT        </a:t>
+            </a:r>
+            <a:r>
+              <a:rPr lang="en-US" sz="1400" dirty="0" smtClean="0">
+                <a:solidFill>
+                  <a:srgbClr val="00B050"/>
+                </a:solidFill>
+                <a:latin typeface="Courier New" pitchFamily="49" charset="0"/>
+                <a:cs typeface="Courier New" pitchFamily="49" charset="0"/>
+              </a:rPr>
+              <a:t>; pull-up or pull-down?</a:t>
+            </a:r>
+            <a:endParaRPr lang="en-US" sz="1400" dirty="0">
+              <a:solidFill>
+                <a:srgbClr val="00B050"/>
+              </a:solidFill>
+              <a:latin typeface="Courier New" pitchFamily="49" charset="0"/>
+              <a:cs typeface="Courier New" pitchFamily="49" charset="0"/>
+            </a:endParaRPr>
+          </a:p>
+          <a:p>
+            <a:pPr marL="0" indent="0">
+              <a:buNone/>
+            </a:pPr>
+            <a:endParaRPr lang="en-US" sz="1400" dirty="0">
+              <a:solidFill>
+                <a:schemeClr val="accent2"/>
+              </a:solidFill>
+              <a:latin typeface="Courier New" pitchFamily="49" charset="0"/>
+              <a:cs typeface="Courier New" pitchFamily="49" charset="0"/>
+            </a:endParaRPr>
+          </a:p>
+          <a:p>
+            <a:pPr marL="0" indent="0">
+              <a:buNone/>
+            </a:pPr>
+            <a:r>
+              <a:rPr lang="en-US" sz="1400" dirty="0" err="1">
+                <a:solidFill>
+                  <a:schemeClr val="accent2"/>
+                </a:solidFill>
+                <a:latin typeface="Courier New" pitchFamily="49" charset="0"/>
+                <a:cs typeface="Courier New" pitchFamily="49" charset="0"/>
+              </a:rPr>
+              <a:t>check_btn</a:t>
+            </a:r>
+            <a:r>
+              <a:rPr lang="en-US" sz="1400" dirty="0">
+                <a:solidFill>
+                  <a:schemeClr val="accent2"/>
+                </a:solidFill>
+                <a:latin typeface="Courier New" pitchFamily="49" charset="0"/>
+                <a:cs typeface="Courier New" pitchFamily="49" charset="0"/>
+              </a:rPr>
+              <a:t>:    </a:t>
+            </a:r>
+            <a:r>
+              <a:rPr lang="en-US" sz="1400" dirty="0" err="1">
+                <a:solidFill>
+                  <a:schemeClr val="accent2"/>
+                </a:solidFill>
+                <a:latin typeface="Courier New" pitchFamily="49" charset="0"/>
+                <a:cs typeface="Courier New" pitchFamily="49" charset="0"/>
+              </a:rPr>
+              <a:t>bit.b</a:t>
+            </a:r>
+            <a:r>
+              <a:rPr lang="en-US" sz="1400" dirty="0">
+                <a:solidFill>
+                  <a:schemeClr val="accent2"/>
+                </a:solidFill>
+                <a:latin typeface="Courier New" pitchFamily="49" charset="0"/>
+                <a:cs typeface="Courier New" pitchFamily="49" charset="0"/>
+              </a:rPr>
+              <a:t>  #BIT3, &amp;</a:t>
+            </a:r>
+            <a:r>
+              <a:rPr lang="en-US" sz="1400" dirty="0" smtClean="0">
+                <a:solidFill>
+                  <a:schemeClr val="accent2"/>
+                </a:solidFill>
+                <a:latin typeface="Courier New" pitchFamily="49" charset="0"/>
+                <a:cs typeface="Courier New" pitchFamily="49" charset="0"/>
+              </a:rPr>
+              <a:t>P1IN        </a:t>
+            </a:r>
+            <a:endParaRPr lang="en-US" sz="1400" dirty="0">
+              <a:solidFill>
+                <a:schemeClr val="accent2"/>
+              </a:solidFill>
+              <a:latin typeface="Courier New" pitchFamily="49" charset="0"/>
+              <a:cs typeface="Courier New" pitchFamily="49" charset="0"/>
+            </a:endParaRPr>
+          </a:p>
+          <a:p>
+            <a:pPr marL="0" indent="0">
+              <a:buNone/>
+            </a:pPr>
+            <a:r>
+              <a:rPr lang="en-US" sz="1400" dirty="0" smtClean="0">
+                <a:solidFill>
+                  <a:schemeClr val="accent2"/>
+                </a:solidFill>
+                <a:latin typeface="Courier New" pitchFamily="49" charset="0"/>
+                <a:cs typeface="Courier New" pitchFamily="49" charset="0"/>
+              </a:rPr>
+              <a:t>              </a:t>
+            </a:r>
+            <a:r>
+              <a:rPr lang="en-US" sz="1400" dirty="0" err="1" smtClean="0">
+                <a:solidFill>
+                  <a:schemeClr val="accent2"/>
+                </a:solidFill>
+                <a:latin typeface="Courier New" pitchFamily="49" charset="0"/>
+                <a:cs typeface="Courier New" pitchFamily="49" charset="0"/>
+              </a:rPr>
+              <a:t>jz</a:t>
+            </a:r>
+            <a:r>
+              <a:rPr lang="en-US" sz="1400" dirty="0" smtClean="0">
+                <a:solidFill>
+                  <a:schemeClr val="accent2"/>
+                </a:solidFill>
+                <a:latin typeface="Courier New" pitchFamily="49" charset="0"/>
+                <a:cs typeface="Courier New" pitchFamily="49" charset="0"/>
+              </a:rPr>
+              <a:t>     </a:t>
+            </a:r>
+            <a:r>
+              <a:rPr lang="en-US" sz="1400" dirty="0" err="1" smtClean="0">
+                <a:solidFill>
+                  <a:schemeClr val="accent2"/>
+                </a:solidFill>
+                <a:latin typeface="Courier New" pitchFamily="49" charset="0"/>
+                <a:cs typeface="Courier New" pitchFamily="49" charset="0"/>
+              </a:rPr>
+              <a:t>set_lights</a:t>
+            </a:r>
+            <a:endParaRPr lang="en-US" sz="1400" dirty="0">
+              <a:solidFill>
+                <a:schemeClr val="accent2"/>
+              </a:solidFill>
+              <a:latin typeface="Courier New" pitchFamily="49" charset="0"/>
+              <a:cs typeface="Courier New" pitchFamily="49" charset="0"/>
+            </a:endParaRPr>
+          </a:p>
+          <a:p>
+            <a:pPr marL="0" indent="0">
+              <a:buNone/>
+            </a:pPr>
+            <a:r>
+              <a:rPr lang="en-US" sz="1400" dirty="0" smtClean="0">
+                <a:solidFill>
+                  <a:schemeClr val="accent2"/>
+                </a:solidFill>
+                <a:latin typeface="Courier New" pitchFamily="49" charset="0"/>
+                <a:cs typeface="Courier New" pitchFamily="49" charset="0"/>
+              </a:rPr>
+              <a:t>              </a:t>
+            </a:r>
+            <a:r>
+              <a:rPr lang="en-US" sz="1400" dirty="0" err="1" smtClean="0">
+                <a:solidFill>
+                  <a:schemeClr val="accent2"/>
+                </a:solidFill>
+                <a:latin typeface="Courier New" pitchFamily="49" charset="0"/>
+                <a:cs typeface="Courier New" pitchFamily="49" charset="0"/>
+              </a:rPr>
+              <a:t>bic.b</a:t>
+            </a:r>
+            <a:r>
+              <a:rPr lang="en-US" sz="1400" dirty="0" smtClean="0">
+                <a:solidFill>
+                  <a:schemeClr val="accent2"/>
+                </a:solidFill>
+                <a:latin typeface="Courier New" pitchFamily="49" charset="0"/>
+                <a:cs typeface="Courier New" pitchFamily="49" charset="0"/>
+              </a:rPr>
+              <a:t>  </a:t>
+            </a:r>
+            <a:r>
+              <a:rPr lang="en-US" sz="1400" dirty="0">
+                <a:solidFill>
+                  <a:schemeClr val="accent2"/>
+                </a:solidFill>
+                <a:latin typeface="Courier New" pitchFamily="49" charset="0"/>
+                <a:cs typeface="Courier New" pitchFamily="49" charset="0"/>
+              </a:rPr>
+              <a:t>#BIT0|BIT6, &amp;P1OUT</a:t>
+            </a:r>
+          </a:p>
+          <a:p>
+            <a:pPr marL="0" indent="0">
+              <a:buNone/>
+            </a:pPr>
+            <a:r>
+              <a:rPr lang="en-US" sz="1400" dirty="0" smtClean="0">
+                <a:solidFill>
+                  <a:schemeClr val="accent2"/>
+                </a:solidFill>
+                <a:latin typeface="Courier New" pitchFamily="49" charset="0"/>
+                <a:cs typeface="Courier New" pitchFamily="49" charset="0"/>
+              </a:rPr>
+              <a:t>              </a:t>
+            </a:r>
+            <a:r>
+              <a:rPr lang="en-US" sz="1400" dirty="0" err="1" smtClean="0">
+                <a:solidFill>
+                  <a:schemeClr val="accent2"/>
+                </a:solidFill>
+                <a:latin typeface="Courier New" pitchFamily="49" charset="0"/>
+                <a:cs typeface="Courier New" pitchFamily="49" charset="0"/>
+              </a:rPr>
+              <a:t>jmp</a:t>
+            </a:r>
+            <a:r>
+              <a:rPr lang="en-US" sz="1400" dirty="0" smtClean="0">
+                <a:solidFill>
+                  <a:schemeClr val="accent2"/>
+                </a:solidFill>
+                <a:latin typeface="Courier New" pitchFamily="49" charset="0"/>
+                <a:cs typeface="Courier New" pitchFamily="49" charset="0"/>
+              </a:rPr>
+              <a:t>    </a:t>
+            </a:r>
+            <a:r>
+              <a:rPr lang="en-US" sz="1400" dirty="0" err="1" smtClean="0">
+                <a:solidFill>
+                  <a:schemeClr val="accent2"/>
+                </a:solidFill>
+                <a:latin typeface="Courier New" pitchFamily="49" charset="0"/>
+                <a:cs typeface="Courier New" pitchFamily="49" charset="0"/>
+              </a:rPr>
+              <a:t>check_btn</a:t>
+            </a:r>
+            <a:endParaRPr lang="en-US" sz="1400" dirty="0">
+              <a:solidFill>
+                <a:schemeClr val="accent2"/>
+              </a:solidFill>
+              <a:latin typeface="Courier New" pitchFamily="49" charset="0"/>
+              <a:cs typeface="Courier New" pitchFamily="49" charset="0"/>
+            </a:endParaRPr>
+          </a:p>
+          <a:p>
+            <a:pPr marL="0" indent="0">
+              <a:buNone/>
+            </a:pPr>
+            <a:r>
+              <a:rPr lang="en-US" sz="1400" dirty="0" err="1">
+                <a:solidFill>
+                  <a:schemeClr val="accent2"/>
+                </a:solidFill>
+                <a:latin typeface="Courier New" pitchFamily="49" charset="0"/>
+                <a:cs typeface="Courier New" pitchFamily="49" charset="0"/>
+              </a:rPr>
+              <a:t>set_lights</a:t>
+            </a:r>
+            <a:r>
+              <a:rPr lang="en-US" sz="1400" dirty="0">
+                <a:solidFill>
+                  <a:schemeClr val="accent2"/>
+                </a:solidFill>
+                <a:latin typeface="Courier New" pitchFamily="49" charset="0"/>
+                <a:cs typeface="Courier New" pitchFamily="49" charset="0"/>
+              </a:rPr>
+              <a:t>:   </a:t>
+            </a:r>
+            <a:r>
+              <a:rPr lang="en-US" sz="1400" dirty="0" err="1">
+                <a:solidFill>
+                  <a:schemeClr val="accent2"/>
+                </a:solidFill>
+                <a:latin typeface="Courier New" pitchFamily="49" charset="0"/>
+                <a:cs typeface="Courier New" pitchFamily="49" charset="0"/>
+              </a:rPr>
+              <a:t>bis.b</a:t>
+            </a:r>
+            <a:r>
+              <a:rPr lang="en-US" sz="1400" dirty="0">
+                <a:solidFill>
+                  <a:schemeClr val="accent2"/>
+                </a:solidFill>
+                <a:latin typeface="Courier New" pitchFamily="49" charset="0"/>
+                <a:cs typeface="Courier New" pitchFamily="49" charset="0"/>
+              </a:rPr>
+              <a:t>  #BIT0|BIT6, &amp;P1OUT</a:t>
+            </a:r>
+          </a:p>
+          <a:p>
+            <a:pPr marL="0" indent="0">
+              <a:buNone/>
+            </a:pPr>
+            <a:r>
+              <a:rPr lang="en-US" sz="1400" dirty="0" smtClean="0">
+                <a:solidFill>
+                  <a:schemeClr val="accent2"/>
+                </a:solidFill>
+                <a:latin typeface="Courier New" pitchFamily="49" charset="0"/>
+                <a:cs typeface="Courier New" pitchFamily="49" charset="0"/>
+              </a:rPr>
+              <a:t>              </a:t>
+            </a:r>
+            <a:r>
+              <a:rPr lang="en-US" sz="1400" dirty="0" err="1" smtClean="0">
+                <a:solidFill>
+                  <a:schemeClr val="accent2"/>
+                </a:solidFill>
+                <a:latin typeface="Courier New" pitchFamily="49" charset="0"/>
+                <a:cs typeface="Courier New" pitchFamily="49" charset="0"/>
+              </a:rPr>
+              <a:t>jmp</a:t>
+            </a:r>
+            <a:r>
+              <a:rPr lang="en-US" sz="1400" dirty="0" smtClean="0">
+                <a:solidFill>
+                  <a:schemeClr val="accent2"/>
+                </a:solidFill>
+                <a:latin typeface="Courier New" pitchFamily="49" charset="0"/>
+                <a:cs typeface="Courier New" pitchFamily="49" charset="0"/>
+              </a:rPr>
+              <a:t>    </a:t>
+            </a:r>
+            <a:r>
+              <a:rPr lang="en-US" sz="1400" dirty="0" err="1" smtClean="0">
+                <a:solidFill>
+                  <a:schemeClr val="accent2"/>
+                </a:solidFill>
+                <a:latin typeface="Courier New" pitchFamily="49" charset="0"/>
+                <a:cs typeface="Courier New" pitchFamily="49" charset="0"/>
+              </a:rPr>
+              <a:t>check_btn</a:t>
+            </a:r>
+            <a:endParaRPr lang="en-US" sz="1400" dirty="0" smtClean="0">
+              <a:solidFill>
+                <a:schemeClr val="accent2"/>
+              </a:solidFill>
+              <a:latin typeface="Courier New" pitchFamily="49" charset="0"/>
+              <a:cs typeface="Courier New" pitchFamily="49" charset="0"/>
+            </a:endParaRPr>
+          </a:p>
+        </p:txBody>
+      </p:sp>
+      <p:pic>
+        <p:nvPicPr>
+          <p:cNvPr id="4" name="Picture 3"/>
+          <p:cNvPicPr>
+            <a:picLocks noChangeAspect="1"/>
+          </p:cNvPicPr>
+          <p:nvPr/>
+        </p:nvPicPr>
+        <p:blipFill>
+          <a:blip r:embed="rId2">
+            <a:extLst>
+              <a:ext uri="{28A0092B-C50C-407E-A947-70E740481C1C}">
+                <a14:useLocalDpi xmlns:a14="http://schemas.microsoft.com/office/drawing/2010/main" val="0"/>
+              </a:ext>
+            </a:extLst>
+          </a:blip>
+          <a:stretch>
+            <a:fillRect/>
+          </a:stretch>
+        </p:blipFill>
+        <p:spPr>
+          <a:xfrm>
+            <a:off x="1729308" y="1482963"/>
+            <a:ext cx="4350651" cy="1655201"/>
+          </a:xfrm>
+          <a:prstGeom prst="rect">
+            <a:avLst/>
+          </a:prstGeom>
+        </p:spPr>
+      </p:pic>
+      <p:sp>
+        <p:nvSpPr>
+          <p:cNvPr id="5" name="Right Brace 4"/>
+          <p:cNvSpPr/>
+          <p:nvPr/>
+        </p:nvSpPr>
+        <p:spPr bwMode="auto">
+          <a:xfrm>
+            <a:off x="4603808" y="4318093"/>
+            <a:ext cx="512379" cy="1347952"/>
+          </a:xfrm>
+          <a:prstGeom prst="rightBrace">
+            <a:avLst/>
+          </a:prstGeom>
+          <a:noFill/>
+          <a:ln w="12700" cap="flat" cmpd="sng" algn="ctr">
+            <a:solidFill>
+              <a:schemeClr val="tx1"/>
+            </a:solidFill>
+            <a:prstDash val="solid"/>
+            <a:round/>
+            <a:headEnd type="none" w="med" len="med"/>
+            <a:tailEnd type="none" w="med" len="med"/>
+          </a:ln>
+          <a:effectLst/>
+        </p:spPr>
+        <p:txBody>
+          <a:bodyPr vert="horz" wrap="square" lIns="91440" tIns="45720" rIns="91440" bIns="45720" numCol="1" rtlCol="0" anchor="t" anchorCtr="0" compatLnSpc="1">
+            <a:prstTxWarp prst="textNoShape">
+              <a:avLst/>
+            </a:prstTxWarp>
+          </a:bodyPr>
+          <a:lstStyle/>
+          <a:p>
+            <a:pPr marL="0" marR="0" indent="0" algn="ctr" defTabSz="914400" rtl="0" eaLnBrk="0" fontAlgn="base" latinLnBrk="0" hangingPunct="0">
+              <a:lnSpc>
+                <a:spcPct val="100000"/>
+              </a:lnSpc>
+              <a:spcBef>
+                <a:spcPct val="0"/>
+              </a:spcBef>
+              <a:spcAft>
+                <a:spcPct val="0"/>
+              </a:spcAft>
+              <a:buClrTx/>
+              <a:buSzTx/>
+              <a:buFontTx/>
+              <a:buNone/>
+              <a:tabLst/>
+            </a:pPr>
+            <a:endParaRPr kumimoji="0" lang="en-US" sz="1600" b="0" i="0" u="none" strike="noStrike" cap="none" normalizeH="0" baseline="0" smtClean="0">
+              <a:ln>
+                <a:noFill/>
+              </a:ln>
+              <a:solidFill>
+                <a:schemeClr val="tx1"/>
+              </a:solidFill>
+              <a:effectLst/>
+              <a:latin typeface="Arial" charset="0"/>
+            </a:endParaRPr>
+          </a:p>
+        </p:txBody>
+      </p:sp>
+      <p:sp>
+        <p:nvSpPr>
+          <p:cNvPr id="6" name="TextBox 5"/>
+          <p:cNvSpPr txBox="1"/>
+          <p:nvPr/>
+        </p:nvSpPr>
+        <p:spPr>
+          <a:xfrm>
+            <a:off x="5116187" y="4761236"/>
+            <a:ext cx="3036409" cy="461665"/>
+          </a:xfrm>
+          <a:prstGeom prst="rect">
+            <a:avLst/>
+          </a:prstGeom>
+          <a:noFill/>
+        </p:spPr>
+        <p:txBody>
+          <a:bodyPr wrap="none" rtlCol="0">
+            <a:spAutoFit/>
+          </a:bodyPr>
+          <a:lstStyle/>
+          <a:p>
+            <a:r>
+              <a:rPr lang="en-US" dirty="0" smtClean="0"/>
+              <a:t>What is going on here?</a:t>
+            </a:r>
+            <a:endParaRPr lang="en-US" dirty="0"/>
+          </a:p>
+        </p:txBody>
+      </p:sp>
+      <p:sp>
+        <p:nvSpPr>
+          <p:cNvPr id="7" name="Rectangle 6"/>
+          <p:cNvSpPr/>
+          <p:nvPr/>
+        </p:nvSpPr>
+        <p:spPr bwMode="auto">
+          <a:xfrm>
+            <a:off x="907808" y="5798006"/>
+            <a:ext cx="7230175" cy="785556"/>
+          </a:xfrm>
+          <a:prstGeom prst="rect">
+            <a:avLst/>
+          </a:prstGeom>
+          <a:solidFill>
+            <a:srgbClr val="0C2D83"/>
+          </a:solidFill>
+          <a:ln w="12700" cap="flat" cmpd="sng" algn="ctr">
+            <a:solidFill>
+              <a:schemeClr val="accent6">
+                <a:lumMod val="40000"/>
+                <a:lumOff val="60000"/>
+              </a:schemeClr>
+            </a:solidFill>
+            <a:prstDash val="solid"/>
+            <a:round/>
+            <a:headEnd type="none" w="med" len="med"/>
+            <a:tailEnd type="none" w="med" len="med"/>
+          </a:ln>
+          <a:effectLst/>
+        </p:spPr>
+        <p:txBody>
+          <a:bodyPr vert="horz" wrap="square" lIns="91440" tIns="45720" rIns="91440" bIns="45720" numCol="1" rtlCol="0" anchor="ctr" anchorCtr="0" compatLnSpc="1">
+            <a:prstTxWarp prst="textNoShape">
+              <a:avLst/>
+            </a:prstTxWarp>
+          </a:bodyPr>
+          <a:lstStyle/>
+          <a:p>
+            <a:pPr marL="0" marR="0" indent="0" algn="ctr" defTabSz="914400" rtl="0" eaLnBrk="0" fontAlgn="base" latinLnBrk="0" hangingPunct="0">
+              <a:lnSpc>
+                <a:spcPct val="100000"/>
+              </a:lnSpc>
+              <a:spcBef>
+                <a:spcPct val="0"/>
+              </a:spcBef>
+              <a:spcAft>
+                <a:spcPct val="0"/>
+              </a:spcAft>
+              <a:buClrTx/>
+              <a:buSzTx/>
+              <a:buFontTx/>
+              <a:buNone/>
+              <a:tabLst/>
+            </a:pPr>
+            <a:r>
+              <a:rPr kumimoji="0" lang="en-US" sz="1600" b="0" i="0" u="none" strike="noStrike" cap="none" normalizeH="0" baseline="0" dirty="0" smtClean="0">
+                <a:ln>
+                  <a:noFill/>
+                </a:ln>
+                <a:solidFill>
+                  <a:schemeClr val="bg1"/>
+                </a:solidFill>
+                <a:effectLst/>
+                <a:latin typeface="Arial" charset="0"/>
+              </a:rPr>
+              <a:t>Time permitting, let’s run this on your </a:t>
+            </a:r>
+            <a:r>
+              <a:rPr kumimoji="0" lang="en-US" sz="1600" b="0" i="0" u="none" strike="noStrike" cap="none" normalizeH="0" baseline="0" dirty="0" smtClean="0">
+                <a:ln>
+                  <a:noFill/>
+                </a:ln>
+                <a:solidFill>
+                  <a:schemeClr val="bg1"/>
+                </a:solidFill>
+                <a:effectLst/>
+                <a:latin typeface="Arial" charset="0"/>
+              </a:rPr>
+              <a:t>processor, if not, you need to step through this code and</a:t>
+            </a:r>
+            <a:r>
+              <a:rPr kumimoji="0" lang="en-US" sz="1600" b="0" i="0" u="none" strike="noStrike" cap="none" normalizeH="0" dirty="0" smtClean="0">
+                <a:ln>
+                  <a:noFill/>
+                </a:ln>
+                <a:solidFill>
+                  <a:schemeClr val="bg1"/>
+                </a:solidFill>
+                <a:effectLst/>
+                <a:latin typeface="Arial" charset="0"/>
+              </a:rPr>
+              <a:t> understand it</a:t>
+            </a:r>
+            <a:endParaRPr kumimoji="0" lang="en-US" sz="1600" b="0" i="0" u="none" strike="noStrike" cap="none" normalizeH="0" baseline="0" dirty="0" smtClean="0">
+              <a:ln>
+                <a:noFill/>
+              </a:ln>
+              <a:solidFill>
+                <a:schemeClr val="bg1"/>
+              </a:solidFill>
+              <a:effectLst/>
+              <a:latin typeface="Arial" charset="0"/>
+            </a:endParaRPr>
+          </a:p>
+        </p:txBody>
+      </p:sp>
+    </p:spTree>
+    <p:extLst>
+      <p:ext uri="{BB962C8B-B14F-4D97-AF65-F5344CB8AC3E}">
+        <p14:creationId xmlns:p14="http://schemas.microsoft.com/office/powerpoint/2010/main" val="1575778019"/>
       </p:ext>
     </p:extLst>
   </p:cSld>
@@ -14295,6 +14339,13 @@
   <p:clrMapOvr>
     <a:masterClrMapping/>
   </p:clrMapOvr>
+  <p:timing>
+    <p:tnLst>
+      <p:par>
+        <p:cTn id="1" dur="indefinite" restart="never" nodeType="tmRoot"/>
+      </p:par>
+    </p:tnLst>
+  </p:timing>
 </p:sld>
 </file>
 

</xml_diff>